<commit_message>
Actualizo README y scripts con cambios al 20-10
</commit_message>
<xml_diff>
--- a/spotify_portfolio_creative_strategy.pptx
+++ b/spotify_portfolio_creative_strategy.pptx
@@ -10,9 +10,10 @@
     <p:sldId id="258" r:id="rId4"/>
     <p:sldId id="259" r:id="rId5"/>
     <p:sldId id="260" r:id="rId6"/>
-    <p:sldId id="261" r:id="rId7"/>
-    <p:sldId id="262" r:id="rId8"/>
-    <p:sldId id="263" r:id="rId9"/>
+    <p:sldId id="264" r:id="rId7"/>
+    <p:sldId id="261" r:id="rId8"/>
+    <p:sldId id="262" r:id="rId9"/>
+    <p:sldId id="263" r:id="rId10"/>
   </p:sldIdLst>
   <p:sldSz cx="9144000" cy="6858000" type="screen4x3"/>
   <p:notesSz cx="6858000" cy="9144000"/>
@@ -5854,7 +5855,7 @@
         </p:nvSpPr>
         <p:spPr>
           <a:xfrm>
-            <a:off x="1658897" y="593777"/>
+            <a:off x="1654138" y="593777"/>
             <a:ext cx="5553183" cy="461665"/>
           </a:xfrm>
           <a:prstGeom prst="rect">
@@ -5892,7 +5893,7 @@
         <p:spPr>
           <a:xfrm>
             <a:off x="713857" y="5653353"/>
-            <a:ext cx="8091096" cy="830997"/>
+            <a:ext cx="8091096" cy="461665"/>
           </a:xfrm>
           <a:prstGeom prst="rect">
             <a:avLst/>
@@ -5918,7 +5919,7 @@
                   <a:schemeClr val="tx2"/>
                 </a:solidFill>
               </a:rPr>
-              <a:t>Jesika Berroteran | Data Engineering &amp; Creative Analytics</a:t>
+              <a:t>Jesika Berroteran | Data Engineering</a:t>
             </a:r>
           </a:p>
         </p:txBody>
@@ -5937,7 +5938,7 @@
         </p:nvSpPr>
         <p:spPr>
           <a:xfrm>
-            <a:off x="1181528" y="2437001"/>
+            <a:off x="1226118" y="2184295"/>
             <a:ext cx="1140432" cy="461665"/>
           </a:xfrm>
           <a:prstGeom prst="roundRect">
@@ -5984,7 +5985,7 @@
         </p:nvSpPr>
         <p:spPr>
           <a:xfrm>
-            <a:off x="2726445" y="1838879"/>
+            <a:off x="2949391" y="1586173"/>
             <a:ext cx="1217488" cy="1657911"/>
           </a:xfrm>
           <a:prstGeom prst="roundRect">
@@ -6009,7 +6010,6 @@
           <a:bodyPr rtlCol="0" anchor="t"/>
           <a:lstStyle/>
           <a:p>
-            <a:pPr algn="ctr"/>
             <a:r>
               <a:rPr lang="es-AR" b="1" dirty="0" err="1">
                 <a:solidFill>
@@ -6027,10 +6027,14 @@
             </a:endParaRPr>
           </a:p>
           <a:p>
-            <a:pPr algn="ctr"/>
-            <a:br>
-              <a:rPr lang="es-AR" dirty="0"/>
-            </a:br>
+            <a:endParaRPr lang="es-AR" sz="1800" b="1" dirty="0">
+              <a:solidFill>
+                <a:schemeClr val="tx1"/>
+              </a:solidFill>
+              <a:latin typeface="Arial Rounded MT Bold" panose="020F0704030504030204" pitchFamily="34" charset="0"/>
+            </a:endParaRPr>
+          </a:p>
+          <a:p>
             <a:r>
               <a:rPr lang="es-AR" sz="1800" b="1" dirty="0"/>
               <a:t>GET</a:t>
@@ -6082,7 +6086,7 @@
         </p:nvSpPr>
         <p:spPr>
           <a:xfrm>
-            <a:off x="4238762" y="1838879"/>
+            <a:off x="4461708" y="1586173"/>
             <a:ext cx="1621973" cy="1657910"/>
           </a:xfrm>
           <a:prstGeom prst="roundRect">
@@ -6167,7 +6171,7 @@
             </a:r>
             <a:r>
               <a:rPr lang="es-AR" sz="1400" dirty="0" err="1"/>
-              <a:t>Jeson</a:t>
+              <a:t>Json</a:t>
             </a:r>
             <a:r>
               <a:rPr lang="es-AR" sz="1400" dirty="0"/>
@@ -6179,6 +6183,14 @@
             <a:r>
               <a:rPr lang="es-AR" sz="1400" dirty="0" err="1"/>
               <a:t>Metrics</a:t>
+            </a:r>
+            <a:r>
+              <a:rPr lang="es-AR" sz="1400" dirty="0"/>
+              <a:t>. </a:t>
+            </a:r>
+            <a:r>
+              <a:rPr lang="es-AR" sz="1400" dirty="0" err="1"/>
+              <a:t>f_final</a:t>
             </a:r>
             <a:endParaRPr lang="es-AR" sz="1400" dirty="0"/>
           </a:p>
@@ -6198,7 +6210,7 @@
         </p:nvSpPr>
         <p:spPr>
           <a:xfrm>
-            <a:off x="6164626" y="1827958"/>
+            <a:off x="6387572" y="1575252"/>
             <a:ext cx="1380940" cy="1693836"/>
           </a:xfrm>
           <a:prstGeom prst="roundRect">
@@ -6268,49 +6280,6 @@
           </a:p>
         </p:txBody>
       </p:sp>
-      <p:cxnSp>
-        <p:nvCxnSpPr>
-          <p:cNvPr id="9" name="Straight Arrow Connector 8">
-            <a:extLst>
-              <a:ext uri="{FF2B5EF4-FFF2-40B4-BE49-F238E27FC236}">
-                <a16:creationId xmlns:a16="http://schemas.microsoft.com/office/drawing/2014/main" id="{6ACBEF27-57AA-474C-AC0A-269D4F7D88F1}"/>
-              </a:ext>
-            </a:extLst>
-          </p:cNvPr>
-          <p:cNvCxnSpPr>
-            <a:cxnSpLocks/>
-            <a:stCxn id="4" idx="3"/>
-            <a:endCxn id="5" idx="1"/>
-          </p:cNvCxnSpPr>
-          <p:nvPr/>
-        </p:nvCxnSpPr>
-        <p:spPr>
-          <a:xfrm>
-            <a:off x="2321960" y="2667834"/>
-            <a:ext cx="404485" cy="1"/>
-          </a:xfrm>
-          <a:prstGeom prst="straightConnector1">
-            <a:avLst/>
-          </a:prstGeom>
-          <a:ln>
-            <a:tailEnd type="triangle"/>
-          </a:ln>
-        </p:spPr>
-        <p:style>
-          <a:lnRef idx="2">
-            <a:schemeClr val="accent1"/>
-          </a:lnRef>
-          <a:fillRef idx="0">
-            <a:schemeClr val="accent1"/>
-          </a:fillRef>
-          <a:effectRef idx="1">
-            <a:schemeClr val="accent1"/>
-          </a:effectRef>
-          <a:fontRef idx="minor">
-            <a:schemeClr val="tx1"/>
-          </a:fontRef>
-        </p:style>
-      </p:cxnSp>
       <p:pic>
         <p:nvPicPr>
           <p:cNvPr id="27" name="Picture 26">
@@ -6333,7 +6302,7 @@
         </p:blipFill>
         <p:spPr>
           <a:xfrm>
-            <a:off x="754954" y="1815398"/>
+            <a:off x="572643" y="1262405"/>
             <a:ext cx="445944" cy="445944"/>
           </a:xfrm>
           <a:prstGeom prst="rect">
@@ -6363,7 +6332,7 @@
         </p:blipFill>
         <p:spPr>
           <a:xfrm>
-            <a:off x="6680483" y="3427876"/>
+            <a:off x="6903429" y="3175170"/>
             <a:ext cx="349225" cy="454651"/>
           </a:xfrm>
           <a:prstGeom prst="rect">
@@ -6393,7 +6362,7 @@
         </p:blipFill>
         <p:spPr>
           <a:xfrm>
-            <a:off x="6907928" y="2912676"/>
+            <a:off x="7130874" y="2659970"/>
             <a:ext cx="941529" cy="412480"/>
           </a:xfrm>
           <a:prstGeom prst="rect">
@@ -6423,7 +6392,7 @@
         </p:blipFill>
         <p:spPr>
           <a:xfrm>
-            <a:off x="6314174" y="2991431"/>
+            <a:off x="6537120" y="2738725"/>
             <a:ext cx="315179" cy="336191"/>
           </a:xfrm>
           <a:prstGeom prst="rect">
@@ -6445,7 +6414,7 @@
         </p:nvGrpSpPr>
         <p:grpSpPr>
           <a:xfrm>
-            <a:off x="536111" y="4062235"/>
+            <a:off x="3335562" y="4087064"/>
             <a:ext cx="2190334" cy="819692"/>
             <a:chOff x="4238762" y="4175560"/>
             <a:chExt cx="2190334" cy="819692"/>
@@ -6526,8 +6495,8 @@
         </p:nvSpPr>
         <p:spPr>
           <a:xfrm>
-            <a:off x="344535" y="1488632"/>
-            <a:ext cx="8091097" cy="3904179"/>
+            <a:off x="344535" y="1116303"/>
+            <a:ext cx="8435083" cy="3979679"/>
           </a:xfrm>
           <a:prstGeom prst="rect">
             <a:avLst/>
@@ -8885,7 +8854,13 @@
       </p:grpSpPr>
       <p:sp>
         <p:nvSpPr>
-          <p:cNvPr id="2" name="Title 1"/>
+          <p:cNvPr id="2" name="Title 1">
+            <a:extLst>
+              <a:ext uri="{FF2B5EF4-FFF2-40B4-BE49-F238E27FC236}">
+                <a16:creationId xmlns:a16="http://schemas.microsoft.com/office/drawing/2014/main" id="{57B89FC1-7F0D-4FDA-8E3E-F04511E42480}"/>
+              </a:ext>
+            </a:extLst>
+          </p:cNvPr>
           <p:cNvSpPr>
             <a:spLocks noGrp="1"/>
           </p:cNvSpPr>
@@ -8895,638 +8870,108 @@
         </p:nvSpPr>
         <p:spPr/>
         <p:txBody>
-          <a:bodyPr>
-            <a:normAutofit/>
-          </a:bodyPr>
+          <a:bodyPr/>
           <a:lstStyle/>
           <a:p>
-            <a:r>
-              <a:t>Insight Clave — KAROL G vs Young Miko</a:t>
-            </a:r>
-          </a:p>
-        </p:txBody>
-      </p:sp>
-      <p:sp>
-        <p:nvSpPr>
-          <p:cNvPr id="3" name="Content Placeholder 2"/>
-          <p:cNvSpPr>
-            <a:spLocks noGrp="1"/>
-          </p:cNvSpPr>
+            <a:endParaRPr lang="es-AR"/>
+          </a:p>
+        </p:txBody>
+      </p:sp>
+      <p:pic>
+        <p:nvPicPr>
+          <p:cNvPr id="5" name="Content Placeholder 4">
+            <a:extLst>
+              <a:ext uri="{FF2B5EF4-FFF2-40B4-BE49-F238E27FC236}">
+                <a16:creationId xmlns:a16="http://schemas.microsoft.com/office/drawing/2014/main" id="{BC6D4069-C89F-4C70-8280-1FFE1D0F69CA}"/>
+              </a:ext>
+            </a:extLst>
+          </p:cNvPr>
+          <p:cNvPicPr>
+            <a:picLocks noGrp="1" noChangeAspect="1"/>
+          </p:cNvPicPr>
           <p:nvPr>
             <p:ph idx="1"/>
           </p:nvPr>
-        </p:nvSpPr>
-        <p:spPr/>
-        <p:txBody>
-          <a:bodyPr/>
-          <a:lstStyle/>
-          <a:p>
-            <a:r>
-              <a:rPr sz="2000" dirty="0">
-                <a:solidFill>
-                  <a:schemeClr val="tx1">
-                    <a:lumMod val="95000"/>
-                  </a:schemeClr>
-                </a:solidFill>
-                <a:latin typeface="Bahnschrift" panose="020B0502040204020203" pitchFamily="34" charset="0"/>
-              </a:rPr>
-              <a:t>El </a:t>
-            </a:r>
-            <a:r>
-              <a:rPr sz="2000" dirty="0" err="1">
-                <a:solidFill>
-                  <a:schemeClr val="tx1">
-                    <a:lumMod val="95000"/>
-                  </a:schemeClr>
-                </a:solidFill>
-                <a:latin typeface="Bahnschrift" panose="020B0502040204020203" pitchFamily="34" charset="0"/>
-              </a:rPr>
-              <a:t>análisis</a:t>
-            </a:r>
-            <a:r>
-              <a:rPr sz="2000" dirty="0">
-                <a:solidFill>
-                  <a:schemeClr val="tx1">
-                    <a:lumMod val="95000"/>
-                  </a:schemeClr>
-                </a:solidFill>
-                <a:latin typeface="Bahnschrift" panose="020B0502040204020203" pitchFamily="34" charset="0"/>
-              </a:rPr>
-              <a:t> </a:t>
-            </a:r>
-            <a:r>
-              <a:rPr sz="2000" dirty="0" err="1">
-                <a:solidFill>
-                  <a:schemeClr val="tx1">
-                    <a:lumMod val="95000"/>
-                  </a:schemeClr>
-                </a:solidFill>
-                <a:latin typeface="Bahnschrift" panose="020B0502040204020203" pitchFamily="34" charset="0"/>
-              </a:rPr>
-              <a:t>revela</a:t>
-            </a:r>
-            <a:r>
-              <a:rPr sz="2000" dirty="0">
-                <a:solidFill>
-                  <a:schemeClr val="tx1">
-                    <a:lumMod val="95000"/>
-                  </a:schemeClr>
-                </a:solidFill>
-                <a:latin typeface="Bahnschrift" panose="020B0502040204020203" pitchFamily="34" charset="0"/>
-              </a:rPr>
-              <a:t> una </a:t>
-            </a:r>
-            <a:r>
-              <a:rPr sz="2000" dirty="0" err="1">
-                <a:solidFill>
-                  <a:schemeClr val="tx1">
-                    <a:lumMod val="95000"/>
-                  </a:schemeClr>
-                </a:solidFill>
-                <a:latin typeface="Bahnschrift" panose="020B0502040204020203" pitchFamily="34" charset="0"/>
-              </a:rPr>
-              <a:t>paradoja</a:t>
-            </a:r>
-            <a:r>
-              <a:rPr sz="2000" dirty="0">
-                <a:solidFill>
-                  <a:schemeClr val="tx1">
-                    <a:lumMod val="95000"/>
-                  </a:schemeClr>
-                </a:solidFill>
-                <a:latin typeface="Bahnschrift" panose="020B0502040204020203" pitchFamily="34" charset="0"/>
-              </a:rPr>
-              <a:t> del </a:t>
-            </a:r>
-            <a:r>
-              <a:rPr sz="2000" dirty="0" err="1">
-                <a:solidFill>
-                  <a:schemeClr val="tx1">
-                    <a:lumMod val="95000"/>
-                  </a:schemeClr>
-                </a:solidFill>
-                <a:latin typeface="Bahnschrift" panose="020B0502040204020203" pitchFamily="34" charset="0"/>
-              </a:rPr>
-              <a:t>éxito</a:t>
-            </a:r>
-            <a:r>
-              <a:rPr sz="2000" dirty="0">
-                <a:solidFill>
-                  <a:schemeClr val="tx1">
-                    <a:lumMod val="95000"/>
-                  </a:schemeClr>
-                </a:solidFill>
-                <a:latin typeface="Bahnschrift" panose="020B0502040204020203" pitchFamily="34" charset="0"/>
-              </a:rPr>
-              <a:t>:</a:t>
-            </a:r>
-            <a:endParaRPr lang="es-AR" sz="2000" dirty="0">
-              <a:solidFill>
-                <a:schemeClr val="tx1">
-                  <a:lumMod val="95000"/>
-                </a:schemeClr>
-              </a:solidFill>
-              <a:latin typeface="Bahnschrift" panose="020B0502040204020203" pitchFamily="34" charset="0"/>
-            </a:endParaRPr>
-          </a:p>
-          <a:p>
-            <a:r>
-              <a:rPr sz="2000" dirty="0">
-                <a:solidFill>
-                  <a:schemeClr val="tx1">
-                    <a:lumMod val="95000"/>
-                  </a:schemeClr>
-                </a:solidFill>
-                <a:latin typeface="Bahnschrift" panose="020B0502040204020203" pitchFamily="34" charset="0"/>
-              </a:rPr>
-              <a:t> KAROL G — base </a:t>
-            </a:r>
-            <a:r>
-              <a:rPr sz="2000" dirty="0" err="1">
-                <a:solidFill>
-                  <a:schemeClr val="tx1">
-                    <a:lumMod val="95000"/>
-                  </a:schemeClr>
-                </a:solidFill>
-                <a:latin typeface="Bahnschrift" panose="020B0502040204020203" pitchFamily="34" charset="0"/>
-              </a:rPr>
-              <a:t>masiva</a:t>
-            </a:r>
-            <a:r>
-              <a:rPr sz="2000" dirty="0">
-                <a:solidFill>
-                  <a:schemeClr val="tx1">
-                    <a:lumMod val="95000"/>
-                  </a:schemeClr>
-                </a:solidFill>
-                <a:latin typeface="Bahnschrift" panose="020B0502040204020203" pitchFamily="34" charset="0"/>
-              </a:rPr>
-              <a:t>, </a:t>
-            </a:r>
-            <a:r>
-              <a:rPr sz="2000" dirty="0" err="1">
-                <a:solidFill>
-                  <a:schemeClr val="tx1">
-                    <a:lumMod val="95000"/>
-                  </a:schemeClr>
-                </a:solidFill>
-                <a:latin typeface="Bahnschrift" panose="020B0502040204020203" pitchFamily="34" charset="0"/>
-              </a:rPr>
-              <a:t>crecimiento</a:t>
-            </a:r>
-            <a:r>
-              <a:rPr sz="2000" dirty="0">
-                <a:solidFill>
-                  <a:schemeClr val="tx1">
-                    <a:lumMod val="95000"/>
-                  </a:schemeClr>
-                </a:solidFill>
-                <a:latin typeface="Bahnschrift" panose="020B0502040204020203" pitchFamily="34" charset="0"/>
-              </a:rPr>
-              <a:t> </a:t>
-            </a:r>
-            <a:r>
-              <a:rPr sz="2000" dirty="0" err="1">
-                <a:solidFill>
-                  <a:schemeClr val="tx1">
-                    <a:lumMod val="95000"/>
-                  </a:schemeClr>
-                </a:solidFill>
-                <a:latin typeface="Bahnschrift" panose="020B0502040204020203" pitchFamily="34" charset="0"/>
-              </a:rPr>
-              <a:t>estable</a:t>
-            </a:r>
-            <a:r>
-              <a:rPr sz="2000" dirty="0">
-                <a:solidFill>
-                  <a:schemeClr val="tx1">
-                    <a:lumMod val="95000"/>
-                  </a:schemeClr>
-                </a:solidFill>
-                <a:latin typeface="Bahnschrift" panose="020B0502040204020203" pitchFamily="34" charset="0"/>
-              </a:rPr>
-              <a:t>.</a:t>
-            </a:r>
-            <a:endParaRPr lang="es-AR" sz="2000" dirty="0">
-              <a:solidFill>
-                <a:schemeClr val="tx1">
-                  <a:lumMod val="95000"/>
-                </a:schemeClr>
-              </a:solidFill>
-              <a:latin typeface="Bahnschrift" panose="020B0502040204020203" pitchFamily="34" charset="0"/>
-            </a:endParaRPr>
-          </a:p>
-          <a:p>
-            <a:r>
-              <a:rPr sz="2000" dirty="0">
-                <a:solidFill>
-                  <a:schemeClr val="tx1">
-                    <a:lumMod val="95000"/>
-                  </a:schemeClr>
-                </a:solidFill>
-                <a:latin typeface="Bahnschrift" panose="020B0502040204020203" pitchFamily="34" charset="0"/>
-              </a:rPr>
-              <a:t> Young Miko — </a:t>
-            </a:r>
-            <a:r>
-              <a:rPr sz="2000" dirty="0" err="1">
-                <a:solidFill>
-                  <a:schemeClr val="tx1">
-                    <a:lumMod val="95000"/>
-                  </a:schemeClr>
-                </a:solidFill>
-                <a:latin typeface="Bahnschrift" panose="020B0502040204020203" pitchFamily="34" charset="0"/>
-              </a:rPr>
-              <a:t>menor</a:t>
-            </a:r>
-            <a:r>
-              <a:rPr sz="2000" dirty="0">
-                <a:solidFill>
-                  <a:schemeClr val="tx1">
-                    <a:lumMod val="95000"/>
-                  </a:schemeClr>
-                </a:solidFill>
-                <a:latin typeface="Bahnschrift" panose="020B0502040204020203" pitchFamily="34" charset="0"/>
-              </a:rPr>
-              <a:t> audiencia, </a:t>
-            </a:r>
-            <a:r>
-              <a:rPr sz="2000" dirty="0" err="1">
-                <a:solidFill>
-                  <a:schemeClr val="tx1">
-                    <a:lumMod val="95000"/>
-                  </a:schemeClr>
-                </a:solidFill>
-                <a:latin typeface="Bahnschrift" panose="020B0502040204020203" pitchFamily="34" charset="0"/>
-              </a:rPr>
-              <a:t>pero</a:t>
-            </a:r>
-            <a:r>
-              <a:rPr sz="2000" dirty="0">
-                <a:solidFill>
-                  <a:schemeClr val="tx1">
-                    <a:lumMod val="95000"/>
-                  </a:schemeClr>
-                </a:solidFill>
-                <a:latin typeface="Bahnschrift" panose="020B0502040204020203" pitchFamily="34" charset="0"/>
-              </a:rPr>
-              <a:t> 30x </a:t>
-            </a:r>
-            <a:r>
-              <a:rPr sz="2000" dirty="0" err="1">
-                <a:solidFill>
-                  <a:schemeClr val="tx1">
-                    <a:lumMod val="95000"/>
-                  </a:schemeClr>
-                </a:solidFill>
-                <a:latin typeface="Bahnschrift" panose="020B0502040204020203" pitchFamily="34" charset="0"/>
-              </a:rPr>
-              <a:t>más</a:t>
-            </a:r>
-            <a:r>
-              <a:rPr sz="2000" dirty="0">
-                <a:solidFill>
-                  <a:schemeClr val="tx1">
-                    <a:lumMod val="95000"/>
-                  </a:schemeClr>
-                </a:solidFill>
-                <a:latin typeface="Bahnschrift" panose="020B0502040204020203" pitchFamily="34" charset="0"/>
-              </a:rPr>
-              <a:t> engagement </a:t>
-            </a:r>
-            <a:r>
-              <a:rPr sz="2000" dirty="0" err="1">
-                <a:solidFill>
-                  <a:schemeClr val="tx1">
-                    <a:lumMod val="95000"/>
-                  </a:schemeClr>
-                </a:solidFill>
-                <a:latin typeface="Bahnschrift" panose="020B0502040204020203" pitchFamily="34" charset="0"/>
-              </a:rPr>
-              <a:t>relativo</a:t>
-            </a:r>
-            <a:r>
-              <a:rPr sz="2000" dirty="0">
-                <a:solidFill>
-                  <a:schemeClr val="tx1">
-                    <a:lumMod val="95000"/>
-                  </a:schemeClr>
-                </a:solidFill>
-                <a:latin typeface="Bahnschrift" panose="020B0502040204020203" pitchFamily="34" charset="0"/>
-              </a:rPr>
-              <a:t>.</a:t>
-            </a:r>
-            <a:endParaRPr lang="es-AR" sz="2000" dirty="0">
-              <a:solidFill>
-                <a:schemeClr val="tx1">
-                  <a:lumMod val="95000"/>
-                </a:schemeClr>
-              </a:solidFill>
-              <a:latin typeface="Bahnschrift" panose="020B0502040204020203" pitchFamily="34" charset="0"/>
-            </a:endParaRPr>
-          </a:p>
-          <a:p>
-            <a:r>
-              <a:rPr sz="2000" dirty="0">
-                <a:solidFill>
-                  <a:schemeClr val="tx1">
-                    <a:lumMod val="95000"/>
-                  </a:schemeClr>
-                </a:solidFill>
-                <a:latin typeface="Bahnschrift" panose="020B0502040204020203" pitchFamily="34" charset="0"/>
-              </a:rPr>
-              <a:t>La </a:t>
-            </a:r>
-            <a:r>
-              <a:rPr sz="2000" dirty="0" err="1">
-                <a:solidFill>
-                  <a:schemeClr val="tx1">
-                    <a:lumMod val="95000"/>
-                  </a:schemeClr>
-                </a:solidFill>
-                <a:latin typeface="Bahnschrift" panose="020B0502040204020203" pitchFamily="34" charset="0"/>
-              </a:rPr>
-              <a:t>madurez</a:t>
-            </a:r>
-            <a:r>
-              <a:rPr sz="2000" dirty="0">
-                <a:solidFill>
-                  <a:schemeClr val="tx1">
-                    <a:lumMod val="95000"/>
-                  </a:schemeClr>
-                </a:solidFill>
-                <a:latin typeface="Bahnschrift" panose="020B0502040204020203" pitchFamily="34" charset="0"/>
-              </a:rPr>
-              <a:t> no </a:t>
-            </a:r>
-            <a:r>
-              <a:rPr sz="2000" dirty="0" err="1">
-                <a:solidFill>
-                  <a:schemeClr val="tx1">
-                    <a:lumMod val="95000"/>
-                  </a:schemeClr>
-                </a:solidFill>
-                <a:latin typeface="Bahnschrift" panose="020B0502040204020203" pitchFamily="34" charset="0"/>
-              </a:rPr>
-              <a:t>siempre</a:t>
-            </a:r>
-            <a:r>
-              <a:rPr sz="2000" dirty="0">
-                <a:solidFill>
-                  <a:schemeClr val="tx1">
-                    <a:lumMod val="95000"/>
-                  </a:schemeClr>
-                </a:solidFill>
-                <a:latin typeface="Bahnschrift" panose="020B0502040204020203" pitchFamily="34" charset="0"/>
-              </a:rPr>
-              <a:t> </a:t>
-            </a:r>
-            <a:r>
-              <a:rPr sz="2000" dirty="0" err="1">
-                <a:solidFill>
-                  <a:schemeClr val="tx1">
-                    <a:lumMod val="95000"/>
-                  </a:schemeClr>
-                </a:solidFill>
-                <a:latin typeface="Bahnschrift" panose="020B0502040204020203" pitchFamily="34" charset="0"/>
-              </a:rPr>
-              <a:t>garantiza</a:t>
-            </a:r>
-            <a:r>
-              <a:rPr sz="2000" dirty="0">
-                <a:solidFill>
-                  <a:schemeClr val="tx1">
-                    <a:lumMod val="95000"/>
-                  </a:schemeClr>
-                </a:solidFill>
-                <a:latin typeface="Bahnschrift" panose="020B0502040204020203" pitchFamily="34" charset="0"/>
-              </a:rPr>
-              <a:t> </a:t>
-            </a:r>
-            <a:r>
-              <a:rPr sz="2000" dirty="0" err="1">
-                <a:solidFill>
-                  <a:schemeClr val="tx1">
-                    <a:lumMod val="95000"/>
-                  </a:schemeClr>
-                </a:solidFill>
-                <a:latin typeface="Bahnschrift" panose="020B0502040204020203" pitchFamily="34" charset="0"/>
-              </a:rPr>
-              <a:t>conexión</a:t>
-            </a:r>
-            <a:r>
-              <a:rPr sz="2000" dirty="0">
-                <a:solidFill>
-                  <a:schemeClr val="tx1">
-                    <a:lumMod val="95000"/>
-                  </a:schemeClr>
-                </a:solidFill>
-                <a:latin typeface="Bahnschrift" panose="020B0502040204020203" pitchFamily="34" charset="0"/>
-              </a:rPr>
-              <a:t>. La </a:t>
-            </a:r>
-            <a:r>
-              <a:rPr sz="2000" dirty="0" err="1">
-                <a:solidFill>
-                  <a:schemeClr val="tx1">
-                    <a:lumMod val="95000"/>
-                  </a:schemeClr>
-                </a:solidFill>
-                <a:latin typeface="Bahnschrift" panose="020B0502040204020203" pitchFamily="34" charset="0"/>
-              </a:rPr>
-              <a:t>artista</a:t>
-            </a:r>
-            <a:r>
-              <a:rPr sz="2000" dirty="0">
-                <a:solidFill>
-                  <a:schemeClr val="tx1">
-                    <a:lumMod val="95000"/>
-                  </a:schemeClr>
-                </a:solidFill>
-                <a:latin typeface="Bahnschrift" panose="020B0502040204020203" pitchFamily="34" charset="0"/>
-              </a:rPr>
-              <a:t> </a:t>
-            </a:r>
-            <a:r>
-              <a:rPr sz="2000" dirty="0" err="1">
-                <a:solidFill>
-                  <a:schemeClr val="tx1">
-                    <a:lumMod val="95000"/>
-                  </a:schemeClr>
-                </a:solidFill>
-                <a:latin typeface="Bahnschrift" panose="020B0502040204020203" pitchFamily="34" charset="0"/>
-              </a:rPr>
-              <a:t>emergente</a:t>
-            </a:r>
-            <a:r>
-              <a:rPr sz="2000" dirty="0">
-                <a:solidFill>
-                  <a:schemeClr val="tx1">
-                    <a:lumMod val="95000"/>
-                  </a:schemeClr>
-                </a:solidFill>
-                <a:latin typeface="Bahnschrift" panose="020B0502040204020203" pitchFamily="34" charset="0"/>
-              </a:rPr>
-              <a:t> </a:t>
-            </a:r>
-            <a:r>
-              <a:rPr sz="2000" dirty="0" err="1">
-                <a:solidFill>
-                  <a:schemeClr val="tx1">
-                    <a:lumMod val="95000"/>
-                  </a:schemeClr>
-                </a:solidFill>
-                <a:latin typeface="Bahnschrift" panose="020B0502040204020203" pitchFamily="34" charset="0"/>
-              </a:rPr>
-              <a:t>logra</a:t>
-            </a:r>
-            <a:r>
-              <a:rPr sz="2000" dirty="0">
-                <a:solidFill>
-                  <a:schemeClr val="tx1">
-                    <a:lumMod val="95000"/>
-                  </a:schemeClr>
-                </a:solidFill>
-                <a:latin typeface="Bahnschrift" panose="020B0502040204020203" pitchFamily="34" charset="0"/>
-              </a:rPr>
-              <a:t> un </a:t>
-            </a:r>
-            <a:r>
-              <a:rPr sz="2000" dirty="0" err="1">
-                <a:solidFill>
-                  <a:schemeClr val="tx1">
-                    <a:lumMod val="95000"/>
-                  </a:schemeClr>
-                </a:solidFill>
-                <a:latin typeface="Bahnschrift" panose="020B0502040204020203" pitchFamily="34" charset="0"/>
-              </a:rPr>
-              <a:t>vínculo</a:t>
-            </a:r>
-            <a:r>
-              <a:rPr sz="2000" dirty="0">
-                <a:solidFill>
-                  <a:schemeClr val="tx1">
-                    <a:lumMod val="95000"/>
-                  </a:schemeClr>
-                </a:solidFill>
-                <a:latin typeface="Bahnschrift" panose="020B0502040204020203" pitchFamily="34" charset="0"/>
-              </a:rPr>
-              <a:t> </a:t>
-            </a:r>
-            <a:r>
-              <a:rPr sz="2000" dirty="0" err="1">
-                <a:solidFill>
-                  <a:schemeClr val="tx1">
-                    <a:lumMod val="95000"/>
-                  </a:schemeClr>
-                </a:solidFill>
-                <a:latin typeface="Bahnschrift" panose="020B0502040204020203" pitchFamily="34" charset="0"/>
-              </a:rPr>
-              <a:t>emocional</a:t>
-            </a:r>
-            <a:r>
-              <a:rPr sz="2000" dirty="0">
-                <a:solidFill>
-                  <a:schemeClr val="tx1">
-                    <a:lumMod val="95000"/>
-                  </a:schemeClr>
-                </a:solidFill>
-                <a:latin typeface="Bahnschrift" panose="020B0502040204020203" pitchFamily="34" charset="0"/>
-              </a:rPr>
-              <a:t> </a:t>
-            </a:r>
-            <a:r>
-              <a:rPr sz="2000" dirty="0" err="1">
-                <a:solidFill>
-                  <a:schemeClr val="tx1">
-                    <a:lumMod val="95000"/>
-                  </a:schemeClr>
-                </a:solidFill>
-                <a:latin typeface="Bahnschrift" panose="020B0502040204020203" pitchFamily="34" charset="0"/>
-              </a:rPr>
-              <a:t>más</a:t>
-            </a:r>
-            <a:r>
-              <a:rPr sz="2000" dirty="0">
-                <a:solidFill>
-                  <a:schemeClr val="tx1">
-                    <a:lumMod val="95000"/>
-                  </a:schemeClr>
-                </a:solidFill>
-                <a:latin typeface="Bahnschrift" panose="020B0502040204020203" pitchFamily="34" charset="0"/>
-              </a:rPr>
-              <a:t> </a:t>
-            </a:r>
-            <a:r>
-              <a:rPr sz="2000" dirty="0" err="1">
-                <a:solidFill>
-                  <a:schemeClr val="tx1">
-                    <a:lumMod val="95000"/>
-                  </a:schemeClr>
-                </a:solidFill>
-                <a:latin typeface="Bahnschrift" panose="020B0502040204020203" pitchFamily="34" charset="0"/>
-              </a:rPr>
-              <a:t>fuerte</a:t>
-            </a:r>
-            <a:r>
-              <a:rPr sz="2000" dirty="0">
-                <a:solidFill>
-                  <a:schemeClr val="tx1">
-                    <a:lumMod val="95000"/>
-                  </a:schemeClr>
-                </a:solidFill>
-                <a:latin typeface="Bahnschrift" panose="020B0502040204020203" pitchFamily="34" charset="0"/>
-              </a:rPr>
-              <a:t> con </a:t>
-            </a:r>
-            <a:r>
-              <a:rPr sz="2000" dirty="0" err="1">
-                <a:solidFill>
-                  <a:schemeClr val="tx1">
-                    <a:lumMod val="95000"/>
-                  </a:schemeClr>
-                </a:solidFill>
-                <a:latin typeface="Bahnschrift" panose="020B0502040204020203" pitchFamily="34" charset="0"/>
-              </a:rPr>
-              <a:t>su</a:t>
-            </a:r>
-            <a:r>
-              <a:rPr sz="2000" dirty="0">
-                <a:solidFill>
-                  <a:schemeClr val="tx1">
-                    <a:lumMod val="95000"/>
-                  </a:schemeClr>
-                </a:solidFill>
-                <a:latin typeface="Bahnschrift" panose="020B0502040204020203" pitchFamily="34" charset="0"/>
-              </a:rPr>
-              <a:t> </a:t>
-            </a:r>
-            <a:r>
-              <a:rPr sz="2000" dirty="0" err="1">
-                <a:solidFill>
-                  <a:schemeClr val="tx1">
-                    <a:lumMod val="95000"/>
-                  </a:schemeClr>
-                </a:solidFill>
-                <a:latin typeface="Bahnschrift" panose="020B0502040204020203" pitchFamily="34" charset="0"/>
-              </a:rPr>
-              <a:t>público</a:t>
-            </a:r>
-            <a:r>
-              <a:rPr sz="2000" dirty="0">
-                <a:solidFill>
-                  <a:schemeClr val="tx1">
-                    <a:lumMod val="95000"/>
-                  </a:schemeClr>
-                </a:solidFill>
-                <a:latin typeface="Bahnschrift" panose="020B0502040204020203" pitchFamily="34" charset="0"/>
-              </a:rPr>
-              <a:t>.</a:t>
-            </a:r>
-          </a:p>
-        </p:txBody>
-      </p:sp>
+        </p:nvPicPr>
+        <p:blipFill>
+          <a:blip r:embed="rId2"/>
+          <a:stretch>
+            <a:fillRect/>
+          </a:stretch>
+        </p:blipFill>
+        <p:spPr>
+          <a:xfrm>
+            <a:off x="457200" y="624043"/>
+            <a:ext cx="4207267" cy="2078871"/>
+          </a:xfrm>
+        </p:spPr>
+      </p:pic>
+      <p:pic>
+        <p:nvPicPr>
+          <p:cNvPr id="7" name="Picture 6">
+            <a:extLst>
+              <a:ext uri="{FF2B5EF4-FFF2-40B4-BE49-F238E27FC236}">
+                <a16:creationId xmlns:a16="http://schemas.microsoft.com/office/drawing/2014/main" id="{2FCEA4F0-0EE0-49CC-BECE-4E23664634C5}"/>
+              </a:ext>
+            </a:extLst>
+          </p:cNvPr>
+          <p:cNvPicPr>
+            <a:picLocks noChangeAspect="1"/>
+          </p:cNvPicPr>
+          <p:nvPr/>
+        </p:nvPicPr>
+        <p:blipFill>
+          <a:blip r:embed="rId3"/>
+          <a:stretch>
+            <a:fillRect/>
+          </a:stretch>
+        </p:blipFill>
+        <p:spPr>
+          <a:xfrm>
+            <a:off x="476126" y="3339961"/>
+            <a:ext cx="4188341" cy="2970287"/>
+          </a:xfrm>
+          <a:prstGeom prst="rect">
+            <a:avLst/>
+          </a:prstGeom>
+        </p:spPr>
+      </p:pic>
+      <p:pic>
+        <p:nvPicPr>
+          <p:cNvPr id="9" name="Picture 8">
+            <a:extLst>
+              <a:ext uri="{FF2B5EF4-FFF2-40B4-BE49-F238E27FC236}">
+                <a16:creationId xmlns:a16="http://schemas.microsoft.com/office/drawing/2014/main" id="{DFF15599-B5A0-4EAD-9DC8-C1C083CBEE3C}"/>
+              </a:ext>
+            </a:extLst>
+          </p:cNvPr>
+          <p:cNvPicPr>
+            <a:picLocks noChangeAspect="1"/>
+          </p:cNvPicPr>
+          <p:nvPr/>
+        </p:nvPicPr>
+        <p:blipFill>
+          <a:blip r:embed="rId4"/>
+          <a:stretch>
+            <a:fillRect/>
+          </a:stretch>
+        </p:blipFill>
+        <p:spPr>
+          <a:xfrm>
+            <a:off x="4896661" y="1795954"/>
+            <a:ext cx="3790139" cy="3088014"/>
+          </a:xfrm>
+          <a:prstGeom prst="rect">
+            <a:avLst/>
+          </a:prstGeom>
+        </p:spPr>
+      </p:pic>
     </p:spTree>
+    <p:extLst>
+      <p:ext uri="{BB962C8B-B14F-4D97-AF65-F5344CB8AC3E}">
+        <p14:creationId xmlns:p14="http://schemas.microsoft.com/office/powerpoint/2010/main" val="2787240936"/>
+      </p:ext>
+    </p:extLst>
   </p:cSld>
   <p:clrMapOvr>
     <a:masterClrMapping/>
@@ -9563,22 +9008,14 @@
         </p:nvSpPr>
         <p:spPr/>
         <p:txBody>
-          <a:bodyPr/>
+          <a:bodyPr>
+            <a:normAutofit/>
+          </a:bodyPr>
           <a:lstStyle/>
           <a:p>
             <a:r>
-              <a:rPr dirty="0" err="1"/>
-              <a:t>Conclusiones</a:t>
-            </a:r>
-            <a:r>
-              <a:rPr dirty="0"/>
-              <a:t> </a:t>
-            </a:r>
-            <a:r>
-              <a:rPr dirty="0" err="1"/>
-              <a:t>Creativas</a:t>
-            </a:r>
-            <a:endParaRPr dirty="0"/>
+              <a:t>Insight Clave — KAROL G vs Young Miko</a:t>
+            </a:r>
           </a:p>
         </p:txBody>
       </p:sp>
@@ -9592,7 +9029,12 @@
             <p:ph idx="1"/>
           </p:nvPr>
         </p:nvSpPr>
-        <p:spPr/>
+        <p:spPr>
+          <a:xfrm>
+            <a:off x="457200" y="1819288"/>
+            <a:ext cx="7772400" cy="3649133"/>
+          </a:xfrm>
+        </p:spPr>
         <p:txBody>
           <a:bodyPr/>
           <a:lstStyle/>
@@ -9606,7 +9048,7 @@
                 </a:solidFill>
                 <a:latin typeface="Bahnschrift" panose="020B0502040204020203" pitchFamily="34" charset="0"/>
               </a:rPr>
-              <a:t>1. El engagement rate es una </a:t>
+              <a:t>El </a:t>
             </a:r>
             <a:r>
               <a:rPr sz="2000" dirty="0" err="1">
@@ -9617,7 +9059,7 @@
                 </a:solidFill>
                 <a:latin typeface="Bahnschrift" panose="020B0502040204020203" pitchFamily="34" charset="0"/>
               </a:rPr>
-              <a:t>métrica</a:t>
+              <a:t>análisis</a:t>
             </a:r>
             <a:r>
               <a:rPr sz="2000" dirty="0">
@@ -9639,7 +9081,7 @@
                 </a:solidFill>
                 <a:latin typeface="Bahnschrift" panose="020B0502040204020203" pitchFamily="34" charset="0"/>
               </a:rPr>
-              <a:t>más</a:t>
+              <a:t>revela</a:t>
             </a:r>
             <a:r>
               <a:rPr sz="2000" dirty="0">
@@ -9650,7 +9092,7 @@
                 </a:solidFill>
                 <a:latin typeface="Bahnschrift" panose="020B0502040204020203" pitchFamily="34" charset="0"/>
               </a:rPr>
-              <a:t> </a:t>
+              <a:t> una </a:t>
             </a:r>
             <a:r>
               <a:rPr sz="2000" dirty="0" err="1">
@@ -9661,7 +9103,7 @@
                 </a:solidFill>
                 <a:latin typeface="Bahnschrift" panose="020B0502040204020203" pitchFamily="34" charset="0"/>
               </a:rPr>
-              <a:t>valiosa</a:t>
+              <a:t>paradoja</a:t>
             </a:r>
             <a:r>
               <a:rPr sz="2000" dirty="0">
@@ -9672,7 +9114,7 @@
                 </a:solidFill>
                 <a:latin typeface="Bahnschrift" panose="020B0502040204020203" pitchFamily="34" charset="0"/>
               </a:rPr>
-              <a:t> que los followers </a:t>
+              <a:t> del </a:t>
             </a:r>
             <a:r>
               <a:rPr sz="2000" dirty="0" err="1">
@@ -9683,7 +9125,7 @@
                 </a:solidFill>
                 <a:latin typeface="Bahnschrift" panose="020B0502040204020203" pitchFamily="34" charset="0"/>
               </a:rPr>
-              <a:t>absolutos</a:t>
+              <a:t>éxito</a:t>
             </a:r>
             <a:r>
               <a:rPr sz="2000" dirty="0">
@@ -9694,7 +9136,7 @@
                 </a:solidFill>
                 <a:latin typeface="Bahnschrift" panose="020B0502040204020203" pitchFamily="34" charset="0"/>
               </a:rPr>
-              <a:t>.</a:t>
+              <a:t>:</a:t>
             </a:r>
             <a:endParaRPr lang="es-AR" sz="2000" dirty="0">
               <a:solidFill>
@@ -9715,7 +9157,7 @@
                 </a:solidFill>
                 <a:latin typeface="Bahnschrift" panose="020B0502040204020203" pitchFamily="34" charset="0"/>
               </a:rPr>
-              <a:t>2. La </a:t>
+              <a:t> KAROL G — base </a:t>
             </a:r>
             <a:r>
               <a:rPr sz="2000" dirty="0" err="1">
@@ -9726,7 +9168,7 @@
                 </a:solidFill>
                 <a:latin typeface="Bahnschrift" panose="020B0502040204020203" pitchFamily="34" charset="0"/>
               </a:rPr>
-              <a:t>diversificación</a:t>
+              <a:t>masiva</a:t>
             </a:r>
             <a:r>
               <a:rPr sz="2000" dirty="0">
@@ -9737,7 +9179,7 @@
                 </a:solidFill>
                 <a:latin typeface="Bahnschrift" panose="020B0502040204020203" pitchFamily="34" charset="0"/>
               </a:rPr>
-              <a:t> de </a:t>
+              <a:t>, </a:t>
             </a:r>
             <a:r>
               <a:rPr sz="2000" dirty="0" err="1">
@@ -9748,7 +9190,7 @@
                 </a:solidFill>
                 <a:latin typeface="Bahnschrift" panose="020B0502040204020203" pitchFamily="34" charset="0"/>
               </a:rPr>
-              <a:t>géneros</a:t>
+              <a:t>crecimiento</a:t>
             </a:r>
             <a:r>
               <a:rPr sz="2000" dirty="0">
@@ -9770,73 +9212,7 @@
                 </a:solidFill>
                 <a:latin typeface="Bahnschrift" panose="020B0502040204020203" pitchFamily="34" charset="0"/>
               </a:rPr>
-              <a:t>abre</a:t>
-            </a:r>
-            <a:r>
-              <a:rPr sz="2000" dirty="0">
-                <a:solidFill>
-                  <a:schemeClr val="tx1">
-                    <a:lumMod val="95000"/>
-                  </a:schemeClr>
-                </a:solidFill>
-                <a:latin typeface="Bahnschrift" panose="020B0502040204020203" pitchFamily="34" charset="0"/>
-              </a:rPr>
-              <a:t> mercados, </a:t>
-            </a:r>
-            <a:r>
-              <a:rPr sz="2000" dirty="0" err="1">
-                <a:solidFill>
-                  <a:schemeClr val="tx1">
-                    <a:lumMod val="95000"/>
-                  </a:schemeClr>
-                </a:solidFill>
-                <a:latin typeface="Bahnschrift" panose="020B0502040204020203" pitchFamily="34" charset="0"/>
-              </a:rPr>
-              <a:t>pero</a:t>
-            </a:r>
-            <a:r>
-              <a:rPr sz="2000" dirty="0">
-                <a:solidFill>
-                  <a:schemeClr val="tx1">
-                    <a:lumMod val="95000"/>
-                  </a:schemeClr>
-                </a:solidFill>
-                <a:latin typeface="Bahnschrift" panose="020B0502040204020203" pitchFamily="34" charset="0"/>
-              </a:rPr>
-              <a:t> no </a:t>
-            </a:r>
-            <a:r>
-              <a:rPr sz="2000" dirty="0" err="1">
-                <a:solidFill>
-                  <a:schemeClr val="tx1">
-                    <a:lumMod val="95000"/>
-                  </a:schemeClr>
-                </a:solidFill>
-                <a:latin typeface="Bahnschrift" panose="020B0502040204020203" pitchFamily="34" charset="0"/>
-              </a:rPr>
-              <a:t>asegura</a:t>
-            </a:r>
-            <a:r>
-              <a:rPr sz="2000" dirty="0">
-                <a:solidFill>
-                  <a:schemeClr val="tx1">
-                    <a:lumMod val="95000"/>
-                  </a:schemeClr>
-                </a:solidFill>
-                <a:latin typeface="Bahnschrift" panose="020B0502040204020203" pitchFamily="34" charset="0"/>
-              </a:rPr>
-              <a:t> </a:t>
-            </a:r>
-            <a:r>
-              <a:rPr sz="2000" dirty="0" err="1">
-                <a:solidFill>
-                  <a:schemeClr val="tx1">
-                    <a:lumMod val="95000"/>
-                  </a:schemeClr>
-                </a:solidFill>
-                <a:latin typeface="Bahnschrift" panose="020B0502040204020203" pitchFamily="34" charset="0"/>
-              </a:rPr>
-              <a:t>popularidad</a:t>
+              <a:t>estable</a:t>
             </a:r>
             <a:r>
               <a:rPr sz="2000" dirty="0">
@@ -9868,7 +9244,7 @@
                 </a:solidFill>
                 <a:latin typeface="Bahnschrift" panose="020B0502040204020203" pitchFamily="34" charset="0"/>
               </a:rPr>
-              <a:t> Artistas </a:t>
+              <a:t> Young Miko — </a:t>
             </a:r>
             <a:r>
               <a:rPr sz="2000" dirty="0" err="1">
@@ -9879,7 +9255,7 @@
                 </a:solidFill>
                 <a:latin typeface="Bahnschrift" panose="020B0502040204020203" pitchFamily="34" charset="0"/>
               </a:rPr>
-              <a:t>emergentes</a:t>
+              <a:t>menor</a:t>
             </a:r>
             <a:r>
               <a:rPr sz="2000" dirty="0">
@@ -9890,7 +9266,7 @@
                 </a:solidFill>
                 <a:latin typeface="Bahnschrift" panose="020B0502040204020203" pitchFamily="34" charset="0"/>
               </a:rPr>
-              <a:t> </a:t>
+              <a:t> audiencia, </a:t>
             </a:r>
             <a:r>
               <a:rPr sz="2000" dirty="0" err="1">
@@ -9901,7 +9277,7 @@
                 </a:solidFill>
                 <a:latin typeface="Bahnschrift" panose="020B0502040204020203" pitchFamily="34" charset="0"/>
               </a:rPr>
-              <a:t>pueden</a:t>
+              <a:t>pero</a:t>
             </a:r>
             <a:r>
               <a:rPr sz="2000" dirty="0">
@@ -9912,7 +9288,7 @@
                 </a:solidFill>
                 <a:latin typeface="Bahnschrift" panose="020B0502040204020203" pitchFamily="34" charset="0"/>
               </a:rPr>
-              <a:t> </a:t>
+              <a:t> 30x </a:t>
             </a:r>
             <a:r>
               <a:rPr sz="2000" dirty="0" err="1">
@@ -9923,7 +9299,7 @@
                 </a:solidFill>
                 <a:latin typeface="Bahnschrift" panose="020B0502040204020203" pitchFamily="34" charset="0"/>
               </a:rPr>
-              <a:t>tener</a:t>
+              <a:t>más</a:t>
             </a:r>
             <a:r>
               <a:rPr sz="2000" dirty="0">
@@ -9934,7 +9310,7 @@
                 </a:solidFill>
                 <a:latin typeface="Bahnschrift" panose="020B0502040204020203" pitchFamily="34" charset="0"/>
               </a:rPr>
-              <a:t> </a:t>
+              <a:t> engagement </a:t>
             </a:r>
             <a:r>
               <a:rPr sz="2000" dirty="0" err="1">
@@ -9945,95 +9321,7 @@
                 </a:solidFill>
                 <a:latin typeface="Bahnschrift" panose="020B0502040204020203" pitchFamily="34" charset="0"/>
               </a:rPr>
-              <a:t>más</a:t>
-            </a:r>
-            <a:r>
-              <a:rPr sz="2000" dirty="0">
-                <a:solidFill>
-                  <a:schemeClr val="tx1">
-                    <a:lumMod val="95000"/>
-                  </a:schemeClr>
-                </a:solidFill>
-                <a:latin typeface="Bahnschrift" panose="020B0502040204020203" pitchFamily="34" charset="0"/>
-              </a:rPr>
-              <a:t> </a:t>
-            </a:r>
-            <a:r>
-              <a:rPr sz="2000" dirty="0" err="1">
-                <a:solidFill>
-                  <a:schemeClr val="tx1">
-                    <a:lumMod val="95000"/>
-                  </a:schemeClr>
-                </a:solidFill>
-                <a:latin typeface="Bahnschrift" panose="020B0502040204020203" pitchFamily="34" charset="0"/>
-              </a:rPr>
-              <a:t>eficiencia</a:t>
-            </a:r>
-            <a:r>
-              <a:rPr sz="2000" dirty="0">
-                <a:solidFill>
-                  <a:schemeClr val="tx1">
-                    <a:lumMod val="95000"/>
-                  </a:schemeClr>
-                </a:solidFill>
-                <a:latin typeface="Bahnschrift" panose="020B0502040204020203" pitchFamily="34" charset="0"/>
-              </a:rPr>
-              <a:t> </a:t>
-            </a:r>
-            <a:r>
-              <a:rPr sz="2000" dirty="0" err="1">
-                <a:solidFill>
-                  <a:schemeClr val="tx1">
-                    <a:lumMod val="95000"/>
-                  </a:schemeClr>
-                </a:solidFill>
-                <a:latin typeface="Bahnschrift" panose="020B0502040204020203" pitchFamily="34" charset="0"/>
-              </a:rPr>
-              <a:t>en</a:t>
-            </a:r>
-            <a:r>
-              <a:rPr sz="2000" dirty="0">
-                <a:solidFill>
-                  <a:schemeClr val="tx1">
-                    <a:lumMod val="95000"/>
-                  </a:schemeClr>
-                </a:solidFill>
-                <a:latin typeface="Bahnschrift" panose="020B0502040204020203" pitchFamily="34" charset="0"/>
-              </a:rPr>
-              <a:t> </a:t>
-            </a:r>
-            <a:r>
-              <a:rPr sz="2000" dirty="0" err="1">
-                <a:solidFill>
-                  <a:schemeClr val="tx1">
-                    <a:lumMod val="95000"/>
-                  </a:schemeClr>
-                </a:solidFill>
-                <a:latin typeface="Bahnschrift" panose="020B0502040204020203" pitchFamily="34" charset="0"/>
-              </a:rPr>
-              <a:t>campañas</a:t>
-            </a:r>
-            <a:r>
-              <a:rPr sz="2000" dirty="0">
-                <a:solidFill>
-                  <a:schemeClr val="tx1">
-                    <a:lumMod val="95000"/>
-                  </a:schemeClr>
-                </a:solidFill>
-                <a:latin typeface="Bahnschrift" panose="020B0502040204020203" pitchFamily="34" charset="0"/>
-              </a:rPr>
-              <a:t> </a:t>
-            </a:r>
-            <a:r>
-              <a:rPr sz="2000" dirty="0" err="1">
-                <a:solidFill>
-                  <a:schemeClr val="tx1">
-                    <a:lumMod val="95000"/>
-                  </a:schemeClr>
-                </a:solidFill>
-                <a:latin typeface="Bahnschrift" panose="020B0502040204020203" pitchFamily="34" charset="0"/>
-              </a:rPr>
-              <a:t>digitales</a:t>
+              <a:t>relativo</a:t>
             </a:r>
             <a:r>
               <a:rPr sz="2000" dirty="0">
@@ -10065,7 +9353,7 @@
                 </a:solidFill>
                 <a:latin typeface="Bahnschrift" panose="020B0502040204020203" pitchFamily="34" charset="0"/>
               </a:rPr>
-              <a:t>4. La </a:t>
+              <a:t>La </a:t>
             </a:r>
             <a:r>
               <a:rPr sz="2000" dirty="0" err="1">
@@ -10076,7 +9364,7 @@
                 </a:solidFill>
                 <a:latin typeface="Bahnschrift" panose="020B0502040204020203" pitchFamily="34" charset="0"/>
               </a:rPr>
-              <a:t>consistencia</a:t>
+              <a:t>madurez</a:t>
             </a:r>
             <a:r>
               <a:rPr sz="2000" dirty="0">
@@ -10087,6 +9375,28 @@
                 </a:solidFill>
                 <a:latin typeface="Bahnschrift" panose="020B0502040204020203" pitchFamily="34" charset="0"/>
               </a:rPr>
+              <a:t> no </a:t>
+            </a:r>
+            <a:r>
+              <a:rPr sz="2000" dirty="0" err="1">
+                <a:solidFill>
+                  <a:schemeClr val="tx1">
+                    <a:lumMod val="95000"/>
+                  </a:schemeClr>
+                </a:solidFill>
+                <a:latin typeface="Bahnschrift" panose="020B0502040204020203" pitchFamily="34" charset="0"/>
+              </a:rPr>
+              <a:t>siempre</a:t>
+            </a:r>
+            <a:r>
+              <a:rPr sz="2000" dirty="0">
+                <a:solidFill>
+                  <a:schemeClr val="tx1">
+                    <a:lumMod val="95000"/>
+                  </a:schemeClr>
+                </a:solidFill>
+                <a:latin typeface="Bahnschrift" panose="020B0502040204020203" pitchFamily="34" charset="0"/>
+              </a:rPr>
               <a:t> </a:t>
             </a:r>
             <a:r>
@@ -10098,7 +9408,7 @@
                 </a:solidFill>
                 <a:latin typeface="Bahnschrift" panose="020B0502040204020203" pitchFamily="34" charset="0"/>
               </a:rPr>
-              <a:t>en</a:t>
+              <a:t>garantiza</a:t>
             </a:r>
             <a:r>
               <a:rPr sz="2000" dirty="0">
@@ -10120,7 +9430,7 @@
                 </a:solidFill>
                 <a:latin typeface="Bahnschrift" panose="020B0502040204020203" pitchFamily="34" charset="0"/>
               </a:rPr>
-              <a:t>lanzamientos</a:t>
+              <a:t>conexión</a:t>
             </a:r>
             <a:r>
               <a:rPr sz="2000" dirty="0">
@@ -10131,6 +9441,28 @@
                 </a:solidFill>
                 <a:latin typeface="Bahnschrift" panose="020B0502040204020203" pitchFamily="34" charset="0"/>
               </a:rPr>
+              <a:t>. La </a:t>
+            </a:r>
+            <a:r>
+              <a:rPr sz="2000" dirty="0" err="1">
+                <a:solidFill>
+                  <a:schemeClr val="tx1">
+                    <a:lumMod val="95000"/>
+                  </a:schemeClr>
+                </a:solidFill>
+                <a:latin typeface="Bahnschrift" panose="020B0502040204020203" pitchFamily="34" charset="0"/>
+              </a:rPr>
+              <a:t>artista</a:t>
+            </a:r>
+            <a:r>
+              <a:rPr sz="2000" dirty="0">
+                <a:solidFill>
+                  <a:schemeClr val="tx1">
+                    <a:lumMod val="95000"/>
+                  </a:schemeClr>
+                </a:solidFill>
+                <a:latin typeface="Bahnschrift" panose="020B0502040204020203" pitchFamily="34" charset="0"/>
+              </a:rPr>
               <a:t> </a:t>
             </a:r>
             <a:r>
@@ -10142,7 +9474,7 @@
                 </a:solidFill>
                 <a:latin typeface="Bahnschrift" panose="020B0502040204020203" pitchFamily="34" charset="0"/>
               </a:rPr>
-              <a:t>mantiene</a:t>
+              <a:t>emergente</a:t>
             </a:r>
             <a:r>
               <a:rPr sz="2000" dirty="0">
@@ -10164,7 +9496,7 @@
                 </a:solidFill>
                 <a:latin typeface="Bahnschrift" panose="020B0502040204020203" pitchFamily="34" charset="0"/>
               </a:rPr>
-              <a:t>relevancia</a:t>
+              <a:t>logra</a:t>
             </a:r>
             <a:r>
               <a:rPr sz="2000" dirty="0">
@@ -10175,6 +9507,28 @@
                 </a:solidFill>
                 <a:latin typeface="Bahnschrift" panose="020B0502040204020203" pitchFamily="34" charset="0"/>
               </a:rPr>
+              <a:t> un </a:t>
+            </a:r>
+            <a:r>
+              <a:rPr sz="2000" dirty="0" err="1">
+                <a:solidFill>
+                  <a:schemeClr val="tx1">
+                    <a:lumMod val="95000"/>
+                  </a:schemeClr>
+                </a:solidFill>
+                <a:latin typeface="Bahnschrift" panose="020B0502040204020203" pitchFamily="34" charset="0"/>
+              </a:rPr>
+              <a:t>vínculo</a:t>
+            </a:r>
+            <a:r>
+              <a:rPr sz="2000" dirty="0">
+                <a:solidFill>
+                  <a:schemeClr val="tx1">
+                    <a:lumMod val="95000"/>
+                  </a:schemeClr>
+                </a:solidFill>
+                <a:latin typeface="Bahnschrift" panose="020B0502040204020203" pitchFamily="34" charset="0"/>
+              </a:rPr>
               <a:t> </a:t>
             </a:r>
             <a:r>
@@ -10186,7 +9540,7 @@
                 </a:solidFill>
                 <a:latin typeface="Bahnschrift" panose="020B0502040204020203" pitchFamily="34" charset="0"/>
               </a:rPr>
-              <a:t>sostenida</a:t>
+              <a:t>emocional</a:t>
             </a:r>
             <a:r>
               <a:rPr sz="2000" dirty="0">
@@ -10197,40 +9551,69 @@
                 </a:solidFill>
                 <a:latin typeface="Bahnschrift" panose="020B0502040204020203" pitchFamily="34" charset="0"/>
               </a:rPr>
-              <a:t>.</a:t>
-            </a:r>
-            <a:endParaRPr lang="es-AR" sz="2000" dirty="0">
-              <a:solidFill>
-                <a:schemeClr val="tx1">
-                  <a:lumMod val="95000"/>
-                </a:schemeClr>
-              </a:solidFill>
-              <a:latin typeface="Bahnschrift" panose="020B0502040204020203" pitchFamily="34" charset="0"/>
-            </a:endParaRPr>
-          </a:p>
-          <a:p>
+              <a:t> </a:t>
+            </a:r>
+            <a:r>
+              <a:rPr sz="2000" dirty="0" err="1">
+                <a:solidFill>
+                  <a:schemeClr val="tx1">
+                    <a:lumMod val="95000"/>
+                  </a:schemeClr>
+                </a:solidFill>
+                <a:latin typeface="Bahnschrift" panose="020B0502040204020203" pitchFamily="34" charset="0"/>
+              </a:rPr>
+              <a:t>más</a:t>
+            </a:r>
             <a:r>
               <a:rPr sz="2000" dirty="0">
                 <a:solidFill>
-                  <a:srgbClr val="FFC000"/>
-                </a:solidFill>
-                <a:latin typeface="Bahnschrift" panose="020B0502040204020203" pitchFamily="34" charset="0"/>
-              </a:rPr>
-              <a:t>→ Los </a:t>
+                  <a:schemeClr val="tx1">
+                    <a:lumMod val="95000"/>
+                  </a:schemeClr>
+                </a:solidFill>
+                <a:latin typeface="Bahnschrift" panose="020B0502040204020203" pitchFamily="34" charset="0"/>
+              </a:rPr>
+              <a:t> </a:t>
             </a:r>
             <a:r>
               <a:rPr sz="2000" dirty="0" err="1">
                 <a:solidFill>
-                  <a:srgbClr val="FFC000"/>
-                </a:solidFill>
-                <a:latin typeface="Bahnschrift" panose="020B0502040204020203" pitchFamily="34" charset="0"/>
-              </a:rPr>
-              <a:t>datos</a:t>
+                  <a:schemeClr val="tx1">
+                    <a:lumMod val="95000"/>
+                  </a:schemeClr>
+                </a:solidFill>
+                <a:latin typeface="Bahnschrift" panose="020B0502040204020203" pitchFamily="34" charset="0"/>
+              </a:rPr>
+              <a:t>fuerte</a:t>
             </a:r>
             <a:r>
               <a:rPr sz="2000" dirty="0">
                 <a:solidFill>
-                  <a:srgbClr val="FFC000"/>
+                  <a:schemeClr val="tx1">
+                    <a:lumMod val="95000"/>
+                  </a:schemeClr>
+                </a:solidFill>
+                <a:latin typeface="Bahnschrift" panose="020B0502040204020203" pitchFamily="34" charset="0"/>
+              </a:rPr>
+              <a:t> con </a:t>
+            </a:r>
+            <a:r>
+              <a:rPr sz="2000" dirty="0" err="1">
+                <a:solidFill>
+                  <a:schemeClr val="tx1">
+                    <a:lumMod val="95000"/>
+                  </a:schemeClr>
+                </a:solidFill>
+                <a:latin typeface="Bahnschrift" panose="020B0502040204020203" pitchFamily="34" charset="0"/>
+              </a:rPr>
+              <a:t>su</a:t>
+            </a:r>
+            <a:r>
+              <a:rPr sz="2000" dirty="0">
+                <a:solidFill>
+                  <a:schemeClr val="tx1">
+                    <a:lumMod val="95000"/>
+                  </a:schemeClr>
                 </a:solidFill>
                 <a:latin typeface="Bahnschrift" panose="020B0502040204020203" pitchFamily="34" charset="0"/>
               </a:rPr>
@@ -10239,88 +9622,20 @@
             <a:r>
               <a:rPr sz="2000" dirty="0" err="1">
                 <a:solidFill>
-                  <a:srgbClr val="FFC000"/>
-                </a:solidFill>
-                <a:latin typeface="Bahnschrift" panose="020B0502040204020203" pitchFamily="34" charset="0"/>
-              </a:rPr>
-              <a:t>pueden</a:t>
+                  <a:schemeClr val="tx1">
+                    <a:lumMod val="95000"/>
+                  </a:schemeClr>
+                </a:solidFill>
+                <a:latin typeface="Bahnschrift" panose="020B0502040204020203" pitchFamily="34" charset="0"/>
+              </a:rPr>
+              <a:t>público</a:t>
             </a:r>
             <a:r>
               <a:rPr sz="2000" dirty="0">
                 <a:solidFill>
-                  <a:srgbClr val="FFC000"/>
-                </a:solidFill>
-                <a:latin typeface="Bahnschrift" panose="020B0502040204020203" pitchFamily="34" charset="0"/>
-              </a:rPr>
-              <a:t> </a:t>
-            </a:r>
-            <a:r>
-              <a:rPr sz="2000" dirty="0" err="1">
-                <a:solidFill>
-                  <a:srgbClr val="FFC000"/>
-                </a:solidFill>
-                <a:latin typeface="Bahnschrift" panose="020B0502040204020203" pitchFamily="34" charset="0"/>
-              </a:rPr>
-              <a:t>inspirar</a:t>
-            </a:r>
-            <a:r>
-              <a:rPr sz="2000" dirty="0">
-                <a:solidFill>
-                  <a:srgbClr val="FFC000"/>
-                </a:solidFill>
-                <a:latin typeface="Bahnschrift" panose="020B0502040204020203" pitchFamily="34" charset="0"/>
-              </a:rPr>
-              <a:t> </a:t>
-            </a:r>
-            <a:r>
-              <a:rPr sz="2000" dirty="0" err="1">
-                <a:solidFill>
-                  <a:srgbClr val="FFC000"/>
-                </a:solidFill>
-                <a:latin typeface="Bahnschrift" panose="020B0502040204020203" pitchFamily="34" charset="0"/>
-              </a:rPr>
-              <a:t>creatividad</a:t>
-            </a:r>
-            <a:r>
-              <a:rPr sz="2000" dirty="0">
-                <a:solidFill>
-                  <a:srgbClr val="FFC000"/>
-                </a:solidFill>
-                <a:latin typeface="Bahnschrift" panose="020B0502040204020203" pitchFamily="34" charset="0"/>
-              </a:rPr>
-              <a:t> y </a:t>
-            </a:r>
-            <a:r>
-              <a:rPr sz="2000" dirty="0" err="1">
-                <a:solidFill>
-                  <a:srgbClr val="FFC000"/>
-                </a:solidFill>
-                <a:latin typeface="Bahnschrift" panose="020B0502040204020203" pitchFamily="34" charset="0"/>
-              </a:rPr>
-              <a:t>decisiones</a:t>
-            </a:r>
-            <a:r>
-              <a:rPr sz="2000" dirty="0">
-                <a:solidFill>
-                  <a:srgbClr val="FFC000"/>
-                </a:solidFill>
-                <a:latin typeface="Bahnschrift" panose="020B0502040204020203" pitchFamily="34" charset="0"/>
-              </a:rPr>
-              <a:t> de alto </a:t>
-            </a:r>
-            <a:r>
-              <a:rPr sz="2000" dirty="0" err="1">
-                <a:solidFill>
-                  <a:srgbClr val="FFC000"/>
-                </a:solidFill>
-                <a:latin typeface="Bahnschrift" panose="020B0502040204020203" pitchFamily="34" charset="0"/>
-              </a:rPr>
-              <a:t>impacto</a:t>
-            </a:r>
-            <a:r>
-              <a:rPr sz="2000" dirty="0">
-                <a:solidFill>
-                  <a:srgbClr val="FFC000"/>
+                  <a:schemeClr val="tx1">
+                    <a:lumMod val="95000"/>
+                  </a:schemeClr>
                 </a:solidFill>
                 <a:latin typeface="Bahnschrift" panose="020B0502040204020203" pitchFamily="34" charset="0"/>
               </a:rPr>
@@ -10356,6 +9671,809 @@
       </p:grpSpPr>
       <p:sp>
         <p:nvSpPr>
+          <p:cNvPr id="2" name="Title 1"/>
+          <p:cNvSpPr>
+            <a:spLocks noGrp="1"/>
+          </p:cNvSpPr>
+          <p:nvPr>
+            <p:ph type="title"/>
+          </p:nvPr>
+        </p:nvSpPr>
+        <p:spPr/>
+        <p:txBody>
+          <a:bodyPr/>
+          <a:lstStyle/>
+          <a:p>
+            <a:r>
+              <a:rPr dirty="0" err="1"/>
+              <a:t>Conclusiones</a:t>
+            </a:r>
+            <a:r>
+              <a:rPr dirty="0"/>
+              <a:t> </a:t>
+            </a:r>
+            <a:r>
+              <a:rPr dirty="0" err="1"/>
+              <a:t>Creativas</a:t>
+            </a:r>
+            <a:endParaRPr dirty="0"/>
+          </a:p>
+        </p:txBody>
+      </p:sp>
+      <p:sp>
+        <p:nvSpPr>
+          <p:cNvPr id="3" name="Content Placeholder 2"/>
+          <p:cNvSpPr>
+            <a:spLocks noGrp="1"/>
+          </p:cNvSpPr>
+          <p:nvPr>
+            <p:ph idx="1"/>
+          </p:nvPr>
+        </p:nvSpPr>
+        <p:spPr/>
+        <p:txBody>
+          <a:bodyPr/>
+          <a:lstStyle/>
+          <a:p>
+            <a:r>
+              <a:rPr sz="2000" dirty="0">
+                <a:solidFill>
+                  <a:schemeClr val="tx1">
+                    <a:lumMod val="95000"/>
+                  </a:schemeClr>
+                </a:solidFill>
+                <a:latin typeface="Bahnschrift" panose="020B0502040204020203" pitchFamily="34" charset="0"/>
+              </a:rPr>
+              <a:t>1. El engagement rate es una </a:t>
+            </a:r>
+            <a:r>
+              <a:rPr sz="2000" dirty="0" err="1">
+                <a:solidFill>
+                  <a:schemeClr val="tx1">
+                    <a:lumMod val="95000"/>
+                  </a:schemeClr>
+                </a:solidFill>
+                <a:latin typeface="Bahnschrift" panose="020B0502040204020203" pitchFamily="34" charset="0"/>
+              </a:rPr>
+              <a:t>métrica</a:t>
+            </a:r>
+            <a:r>
+              <a:rPr sz="2000" dirty="0">
+                <a:solidFill>
+                  <a:schemeClr val="tx1">
+                    <a:lumMod val="95000"/>
+                  </a:schemeClr>
+                </a:solidFill>
+                <a:latin typeface="Bahnschrift" panose="020B0502040204020203" pitchFamily="34" charset="0"/>
+              </a:rPr>
+              <a:t> </a:t>
+            </a:r>
+            <a:r>
+              <a:rPr sz="2000" dirty="0" err="1">
+                <a:solidFill>
+                  <a:schemeClr val="tx1">
+                    <a:lumMod val="95000"/>
+                  </a:schemeClr>
+                </a:solidFill>
+                <a:latin typeface="Bahnschrift" panose="020B0502040204020203" pitchFamily="34" charset="0"/>
+              </a:rPr>
+              <a:t>más</a:t>
+            </a:r>
+            <a:r>
+              <a:rPr sz="2000" dirty="0">
+                <a:solidFill>
+                  <a:schemeClr val="tx1">
+                    <a:lumMod val="95000"/>
+                  </a:schemeClr>
+                </a:solidFill>
+                <a:latin typeface="Bahnschrift" panose="020B0502040204020203" pitchFamily="34" charset="0"/>
+              </a:rPr>
+              <a:t> </a:t>
+            </a:r>
+            <a:r>
+              <a:rPr sz="2000" dirty="0" err="1">
+                <a:solidFill>
+                  <a:schemeClr val="tx1">
+                    <a:lumMod val="95000"/>
+                  </a:schemeClr>
+                </a:solidFill>
+                <a:latin typeface="Bahnschrift" panose="020B0502040204020203" pitchFamily="34" charset="0"/>
+              </a:rPr>
+              <a:t>valiosa</a:t>
+            </a:r>
+            <a:r>
+              <a:rPr sz="2000" dirty="0">
+                <a:solidFill>
+                  <a:schemeClr val="tx1">
+                    <a:lumMod val="95000"/>
+                  </a:schemeClr>
+                </a:solidFill>
+                <a:latin typeface="Bahnschrift" panose="020B0502040204020203" pitchFamily="34" charset="0"/>
+              </a:rPr>
+              <a:t> que los followers </a:t>
+            </a:r>
+            <a:r>
+              <a:rPr sz="2000" dirty="0" err="1">
+                <a:solidFill>
+                  <a:schemeClr val="tx1">
+                    <a:lumMod val="95000"/>
+                  </a:schemeClr>
+                </a:solidFill>
+                <a:latin typeface="Bahnschrift" panose="020B0502040204020203" pitchFamily="34" charset="0"/>
+              </a:rPr>
+              <a:t>absolutos</a:t>
+            </a:r>
+            <a:r>
+              <a:rPr sz="2000" dirty="0">
+                <a:solidFill>
+                  <a:schemeClr val="tx1">
+                    <a:lumMod val="95000"/>
+                  </a:schemeClr>
+                </a:solidFill>
+                <a:latin typeface="Bahnschrift" panose="020B0502040204020203" pitchFamily="34" charset="0"/>
+              </a:rPr>
+              <a:t>.</a:t>
+            </a:r>
+            <a:endParaRPr lang="es-AR" sz="2000" dirty="0">
+              <a:solidFill>
+                <a:schemeClr val="tx1">
+                  <a:lumMod val="95000"/>
+                </a:schemeClr>
+              </a:solidFill>
+              <a:latin typeface="Bahnschrift" panose="020B0502040204020203" pitchFamily="34" charset="0"/>
+            </a:endParaRPr>
+          </a:p>
+          <a:p>
+            <a:r>
+              <a:rPr sz="2000" dirty="0">
+                <a:solidFill>
+                  <a:schemeClr val="tx1">
+                    <a:lumMod val="95000"/>
+                  </a:schemeClr>
+                </a:solidFill>
+                <a:latin typeface="Bahnschrift" panose="020B0502040204020203" pitchFamily="34" charset="0"/>
+              </a:rPr>
+              <a:t>2. La </a:t>
+            </a:r>
+            <a:r>
+              <a:rPr sz="2000" dirty="0" err="1">
+                <a:solidFill>
+                  <a:schemeClr val="tx1">
+                    <a:lumMod val="95000"/>
+                  </a:schemeClr>
+                </a:solidFill>
+                <a:latin typeface="Bahnschrift" panose="020B0502040204020203" pitchFamily="34" charset="0"/>
+              </a:rPr>
+              <a:t>diversificación</a:t>
+            </a:r>
+            <a:r>
+              <a:rPr sz="2000" dirty="0">
+                <a:solidFill>
+                  <a:schemeClr val="tx1">
+                    <a:lumMod val="95000"/>
+                  </a:schemeClr>
+                </a:solidFill>
+                <a:latin typeface="Bahnschrift" panose="020B0502040204020203" pitchFamily="34" charset="0"/>
+              </a:rPr>
+              <a:t> de </a:t>
+            </a:r>
+            <a:r>
+              <a:rPr sz="2000" dirty="0" err="1">
+                <a:solidFill>
+                  <a:schemeClr val="tx1">
+                    <a:lumMod val="95000"/>
+                  </a:schemeClr>
+                </a:solidFill>
+                <a:latin typeface="Bahnschrift" panose="020B0502040204020203" pitchFamily="34" charset="0"/>
+              </a:rPr>
+              <a:t>géneros</a:t>
+            </a:r>
+            <a:r>
+              <a:rPr sz="2000" dirty="0">
+                <a:solidFill>
+                  <a:schemeClr val="tx1">
+                    <a:lumMod val="95000"/>
+                  </a:schemeClr>
+                </a:solidFill>
+                <a:latin typeface="Bahnschrift" panose="020B0502040204020203" pitchFamily="34" charset="0"/>
+              </a:rPr>
+              <a:t> </a:t>
+            </a:r>
+            <a:r>
+              <a:rPr sz="2000" dirty="0" err="1">
+                <a:solidFill>
+                  <a:schemeClr val="tx1">
+                    <a:lumMod val="95000"/>
+                  </a:schemeClr>
+                </a:solidFill>
+                <a:latin typeface="Bahnschrift" panose="020B0502040204020203" pitchFamily="34" charset="0"/>
+              </a:rPr>
+              <a:t>abre</a:t>
+            </a:r>
+            <a:r>
+              <a:rPr sz="2000" dirty="0">
+                <a:solidFill>
+                  <a:schemeClr val="tx1">
+                    <a:lumMod val="95000"/>
+                  </a:schemeClr>
+                </a:solidFill>
+                <a:latin typeface="Bahnschrift" panose="020B0502040204020203" pitchFamily="34" charset="0"/>
+              </a:rPr>
+              <a:t> mercados, </a:t>
+            </a:r>
+            <a:r>
+              <a:rPr sz="2000" dirty="0" err="1">
+                <a:solidFill>
+                  <a:schemeClr val="tx1">
+                    <a:lumMod val="95000"/>
+                  </a:schemeClr>
+                </a:solidFill>
+                <a:latin typeface="Bahnschrift" panose="020B0502040204020203" pitchFamily="34" charset="0"/>
+              </a:rPr>
+              <a:t>pero</a:t>
+            </a:r>
+            <a:r>
+              <a:rPr sz="2000" dirty="0">
+                <a:solidFill>
+                  <a:schemeClr val="tx1">
+                    <a:lumMod val="95000"/>
+                  </a:schemeClr>
+                </a:solidFill>
+                <a:latin typeface="Bahnschrift" panose="020B0502040204020203" pitchFamily="34" charset="0"/>
+              </a:rPr>
+              <a:t> no </a:t>
+            </a:r>
+            <a:r>
+              <a:rPr sz="2000" dirty="0" err="1">
+                <a:solidFill>
+                  <a:schemeClr val="tx1">
+                    <a:lumMod val="95000"/>
+                  </a:schemeClr>
+                </a:solidFill>
+                <a:latin typeface="Bahnschrift" panose="020B0502040204020203" pitchFamily="34" charset="0"/>
+              </a:rPr>
+              <a:t>asegura</a:t>
+            </a:r>
+            <a:r>
+              <a:rPr sz="2000" dirty="0">
+                <a:solidFill>
+                  <a:schemeClr val="tx1">
+                    <a:lumMod val="95000"/>
+                  </a:schemeClr>
+                </a:solidFill>
+                <a:latin typeface="Bahnschrift" panose="020B0502040204020203" pitchFamily="34" charset="0"/>
+              </a:rPr>
+              <a:t> </a:t>
+            </a:r>
+            <a:r>
+              <a:rPr sz="2000" dirty="0" err="1">
+                <a:solidFill>
+                  <a:schemeClr val="tx1">
+                    <a:lumMod val="95000"/>
+                  </a:schemeClr>
+                </a:solidFill>
+                <a:latin typeface="Bahnschrift" panose="020B0502040204020203" pitchFamily="34" charset="0"/>
+              </a:rPr>
+              <a:t>popularidad</a:t>
+            </a:r>
+            <a:r>
+              <a:rPr sz="2000" dirty="0">
+                <a:solidFill>
+                  <a:schemeClr val="tx1">
+                    <a:lumMod val="95000"/>
+                  </a:schemeClr>
+                </a:solidFill>
+                <a:latin typeface="Bahnschrift" panose="020B0502040204020203" pitchFamily="34" charset="0"/>
+              </a:rPr>
+              <a:t>.</a:t>
+            </a:r>
+            <a:endParaRPr lang="es-AR" sz="2000" dirty="0">
+              <a:solidFill>
+                <a:schemeClr val="tx1">
+                  <a:lumMod val="95000"/>
+                </a:schemeClr>
+              </a:solidFill>
+              <a:latin typeface="Bahnschrift" panose="020B0502040204020203" pitchFamily="34" charset="0"/>
+            </a:endParaRPr>
+          </a:p>
+          <a:p>
+            <a:r>
+              <a:rPr sz="2000" dirty="0">
+                <a:solidFill>
+                  <a:schemeClr val="tx1">
+                    <a:lumMod val="95000"/>
+                  </a:schemeClr>
+                </a:solidFill>
+                <a:latin typeface="Bahnschrift" panose="020B0502040204020203" pitchFamily="34" charset="0"/>
+              </a:rPr>
+              <a:t> Artistas </a:t>
+            </a:r>
+            <a:r>
+              <a:rPr sz="2000" dirty="0" err="1">
+                <a:solidFill>
+                  <a:schemeClr val="tx1">
+                    <a:lumMod val="95000"/>
+                  </a:schemeClr>
+                </a:solidFill>
+                <a:latin typeface="Bahnschrift" panose="020B0502040204020203" pitchFamily="34" charset="0"/>
+              </a:rPr>
+              <a:t>emergentes</a:t>
+            </a:r>
+            <a:r>
+              <a:rPr sz="2000" dirty="0">
+                <a:solidFill>
+                  <a:schemeClr val="tx1">
+                    <a:lumMod val="95000"/>
+                  </a:schemeClr>
+                </a:solidFill>
+                <a:latin typeface="Bahnschrift" panose="020B0502040204020203" pitchFamily="34" charset="0"/>
+              </a:rPr>
+              <a:t> </a:t>
+            </a:r>
+            <a:r>
+              <a:rPr sz="2000" dirty="0" err="1">
+                <a:solidFill>
+                  <a:schemeClr val="tx1">
+                    <a:lumMod val="95000"/>
+                  </a:schemeClr>
+                </a:solidFill>
+                <a:latin typeface="Bahnschrift" panose="020B0502040204020203" pitchFamily="34" charset="0"/>
+              </a:rPr>
+              <a:t>pueden</a:t>
+            </a:r>
+            <a:r>
+              <a:rPr sz="2000" dirty="0">
+                <a:solidFill>
+                  <a:schemeClr val="tx1">
+                    <a:lumMod val="95000"/>
+                  </a:schemeClr>
+                </a:solidFill>
+                <a:latin typeface="Bahnschrift" panose="020B0502040204020203" pitchFamily="34" charset="0"/>
+              </a:rPr>
+              <a:t> </a:t>
+            </a:r>
+            <a:r>
+              <a:rPr sz="2000" dirty="0" err="1">
+                <a:solidFill>
+                  <a:schemeClr val="tx1">
+                    <a:lumMod val="95000"/>
+                  </a:schemeClr>
+                </a:solidFill>
+                <a:latin typeface="Bahnschrift" panose="020B0502040204020203" pitchFamily="34" charset="0"/>
+              </a:rPr>
+              <a:t>tener</a:t>
+            </a:r>
+            <a:r>
+              <a:rPr sz="2000" dirty="0">
+                <a:solidFill>
+                  <a:schemeClr val="tx1">
+                    <a:lumMod val="95000"/>
+                  </a:schemeClr>
+                </a:solidFill>
+                <a:latin typeface="Bahnschrift" panose="020B0502040204020203" pitchFamily="34" charset="0"/>
+              </a:rPr>
+              <a:t> </a:t>
+            </a:r>
+            <a:r>
+              <a:rPr sz="2000" dirty="0" err="1">
+                <a:solidFill>
+                  <a:schemeClr val="tx1">
+                    <a:lumMod val="95000"/>
+                  </a:schemeClr>
+                </a:solidFill>
+                <a:latin typeface="Bahnschrift" panose="020B0502040204020203" pitchFamily="34" charset="0"/>
+              </a:rPr>
+              <a:t>más</a:t>
+            </a:r>
+            <a:r>
+              <a:rPr sz="2000" dirty="0">
+                <a:solidFill>
+                  <a:schemeClr val="tx1">
+                    <a:lumMod val="95000"/>
+                  </a:schemeClr>
+                </a:solidFill>
+                <a:latin typeface="Bahnschrift" panose="020B0502040204020203" pitchFamily="34" charset="0"/>
+              </a:rPr>
+              <a:t> </a:t>
+            </a:r>
+            <a:r>
+              <a:rPr sz="2000" dirty="0" err="1">
+                <a:solidFill>
+                  <a:schemeClr val="tx1">
+                    <a:lumMod val="95000"/>
+                  </a:schemeClr>
+                </a:solidFill>
+                <a:latin typeface="Bahnschrift" panose="020B0502040204020203" pitchFamily="34" charset="0"/>
+              </a:rPr>
+              <a:t>eficiencia</a:t>
+            </a:r>
+            <a:r>
+              <a:rPr sz="2000" dirty="0">
+                <a:solidFill>
+                  <a:schemeClr val="tx1">
+                    <a:lumMod val="95000"/>
+                  </a:schemeClr>
+                </a:solidFill>
+                <a:latin typeface="Bahnschrift" panose="020B0502040204020203" pitchFamily="34" charset="0"/>
+              </a:rPr>
+              <a:t> </a:t>
+            </a:r>
+            <a:r>
+              <a:rPr sz="2000" dirty="0" err="1">
+                <a:solidFill>
+                  <a:schemeClr val="tx1">
+                    <a:lumMod val="95000"/>
+                  </a:schemeClr>
+                </a:solidFill>
+                <a:latin typeface="Bahnschrift" panose="020B0502040204020203" pitchFamily="34" charset="0"/>
+              </a:rPr>
+              <a:t>en</a:t>
+            </a:r>
+            <a:r>
+              <a:rPr sz="2000" dirty="0">
+                <a:solidFill>
+                  <a:schemeClr val="tx1">
+                    <a:lumMod val="95000"/>
+                  </a:schemeClr>
+                </a:solidFill>
+                <a:latin typeface="Bahnschrift" panose="020B0502040204020203" pitchFamily="34" charset="0"/>
+              </a:rPr>
+              <a:t> </a:t>
+            </a:r>
+            <a:r>
+              <a:rPr sz="2000" dirty="0" err="1">
+                <a:solidFill>
+                  <a:schemeClr val="tx1">
+                    <a:lumMod val="95000"/>
+                  </a:schemeClr>
+                </a:solidFill>
+                <a:latin typeface="Bahnschrift" panose="020B0502040204020203" pitchFamily="34" charset="0"/>
+              </a:rPr>
+              <a:t>campañas</a:t>
+            </a:r>
+            <a:r>
+              <a:rPr sz="2000" dirty="0">
+                <a:solidFill>
+                  <a:schemeClr val="tx1">
+                    <a:lumMod val="95000"/>
+                  </a:schemeClr>
+                </a:solidFill>
+                <a:latin typeface="Bahnschrift" panose="020B0502040204020203" pitchFamily="34" charset="0"/>
+              </a:rPr>
+              <a:t> </a:t>
+            </a:r>
+            <a:r>
+              <a:rPr sz="2000" dirty="0" err="1">
+                <a:solidFill>
+                  <a:schemeClr val="tx1">
+                    <a:lumMod val="95000"/>
+                  </a:schemeClr>
+                </a:solidFill>
+                <a:latin typeface="Bahnschrift" panose="020B0502040204020203" pitchFamily="34" charset="0"/>
+              </a:rPr>
+              <a:t>digitales</a:t>
+            </a:r>
+            <a:r>
+              <a:rPr sz="2000" dirty="0">
+                <a:solidFill>
+                  <a:schemeClr val="tx1">
+                    <a:lumMod val="95000"/>
+                  </a:schemeClr>
+                </a:solidFill>
+                <a:latin typeface="Bahnschrift" panose="020B0502040204020203" pitchFamily="34" charset="0"/>
+              </a:rPr>
+              <a:t>.</a:t>
+            </a:r>
+            <a:endParaRPr lang="es-AR" sz="2000" dirty="0">
+              <a:solidFill>
+                <a:schemeClr val="tx1">
+                  <a:lumMod val="95000"/>
+                </a:schemeClr>
+              </a:solidFill>
+              <a:latin typeface="Bahnschrift" panose="020B0502040204020203" pitchFamily="34" charset="0"/>
+            </a:endParaRPr>
+          </a:p>
+          <a:p>
+            <a:r>
+              <a:rPr sz="2000" dirty="0">
+                <a:solidFill>
+                  <a:schemeClr val="tx1">
+                    <a:lumMod val="95000"/>
+                  </a:schemeClr>
+                </a:solidFill>
+                <a:latin typeface="Bahnschrift" panose="020B0502040204020203" pitchFamily="34" charset="0"/>
+              </a:rPr>
+              <a:t>4. La </a:t>
+            </a:r>
+            <a:r>
+              <a:rPr sz="2000" dirty="0" err="1">
+                <a:solidFill>
+                  <a:schemeClr val="tx1">
+                    <a:lumMod val="95000"/>
+                  </a:schemeClr>
+                </a:solidFill>
+                <a:latin typeface="Bahnschrift" panose="020B0502040204020203" pitchFamily="34" charset="0"/>
+              </a:rPr>
+              <a:t>consistencia</a:t>
+            </a:r>
+            <a:r>
+              <a:rPr sz="2000" dirty="0">
+                <a:solidFill>
+                  <a:schemeClr val="tx1">
+                    <a:lumMod val="95000"/>
+                  </a:schemeClr>
+                </a:solidFill>
+                <a:latin typeface="Bahnschrift" panose="020B0502040204020203" pitchFamily="34" charset="0"/>
+              </a:rPr>
+              <a:t> </a:t>
+            </a:r>
+            <a:r>
+              <a:rPr sz="2000" dirty="0" err="1">
+                <a:solidFill>
+                  <a:schemeClr val="tx1">
+                    <a:lumMod val="95000"/>
+                  </a:schemeClr>
+                </a:solidFill>
+                <a:latin typeface="Bahnschrift" panose="020B0502040204020203" pitchFamily="34" charset="0"/>
+              </a:rPr>
+              <a:t>en</a:t>
+            </a:r>
+            <a:r>
+              <a:rPr sz="2000" dirty="0">
+                <a:solidFill>
+                  <a:schemeClr val="tx1">
+                    <a:lumMod val="95000"/>
+                  </a:schemeClr>
+                </a:solidFill>
+                <a:latin typeface="Bahnschrift" panose="020B0502040204020203" pitchFamily="34" charset="0"/>
+              </a:rPr>
+              <a:t> </a:t>
+            </a:r>
+            <a:r>
+              <a:rPr sz="2000" dirty="0" err="1">
+                <a:solidFill>
+                  <a:schemeClr val="tx1">
+                    <a:lumMod val="95000"/>
+                  </a:schemeClr>
+                </a:solidFill>
+                <a:latin typeface="Bahnschrift" panose="020B0502040204020203" pitchFamily="34" charset="0"/>
+              </a:rPr>
+              <a:t>lanzamientos</a:t>
+            </a:r>
+            <a:r>
+              <a:rPr sz="2000" dirty="0">
+                <a:solidFill>
+                  <a:schemeClr val="tx1">
+                    <a:lumMod val="95000"/>
+                  </a:schemeClr>
+                </a:solidFill>
+                <a:latin typeface="Bahnschrift" panose="020B0502040204020203" pitchFamily="34" charset="0"/>
+              </a:rPr>
+              <a:t> </a:t>
+            </a:r>
+            <a:r>
+              <a:rPr sz="2000" dirty="0" err="1">
+                <a:solidFill>
+                  <a:schemeClr val="tx1">
+                    <a:lumMod val="95000"/>
+                  </a:schemeClr>
+                </a:solidFill>
+                <a:latin typeface="Bahnschrift" panose="020B0502040204020203" pitchFamily="34" charset="0"/>
+              </a:rPr>
+              <a:t>mantiene</a:t>
+            </a:r>
+            <a:r>
+              <a:rPr sz="2000" dirty="0">
+                <a:solidFill>
+                  <a:schemeClr val="tx1">
+                    <a:lumMod val="95000"/>
+                  </a:schemeClr>
+                </a:solidFill>
+                <a:latin typeface="Bahnschrift" panose="020B0502040204020203" pitchFamily="34" charset="0"/>
+              </a:rPr>
+              <a:t> </a:t>
+            </a:r>
+            <a:r>
+              <a:rPr sz="2000" dirty="0" err="1">
+                <a:solidFill>
+                  <a:schemeClr val="tx1">
+                    <a:lumMod val="95000"/>
+                  </a:schemeClr>
+                </a:solidFill>
+                <a:latin typeface="Bahnschrift" panose="020B0502040204020203" pitchFamily="34" charset="0"/>
+              </a:rPr>
+              <a:t>relevancia</a:t>
+            </a:r>
+            <a:r>
+              <a:rPr sz="2000" dirty="0">
+                <a:solidFill>
+                  <a:schemeClr val="tx1">
+                    <a:lumMod val="95000"/>
+                  </a:schemeClr>
+                </a:solidFill>
+                <a:latin typeface="Bahnschrift" panose="020B0502040204020203" pitchFamily="34" charset="0"/>
+              </a:rPr>
+              <a:t> </a:t>
+            </a:r>
+            <a:r>
+              <a:rPr sz="2000" dirty="0" err="1">
+                <a:solidFill>
+                  <a:schemeClr val="tx1">
+                    <a:lumMod val="95000"/>
+                  </a:schemeClr>
+                </a:solidFill>
+                <a:latin typeface="Bahnschrift" panose="020B0502040204020203" pitchFamily="34" charset="0"/>
+              </a:rPr>
+              <a:t>sostenida</a:t>
+            </a:r>
+            <a:r>
+              <a:rPr sz="2000" dirty="0">
+                <a:solidFill>
+                  <a:schemeClr val="tx1">
+                    <a:lumMod val="95000"/>
+                  </a:schemeClr>
+                </a:solidFill>
+                <a:latin typeface="Bahnschrift" panose="020B0502040204020203" pitchFamily="34" charset="0"/>
+              </a:rPr>
+              <a:t>.</a:t>
+            </a:r>
+            <a:endParaRPr lang="es-AR" sz="2000" dirty="0">
+              <a:solidFill>
+                <a:schemeClr val="tx1">
+                  <a:lumMod val="95000"/>
+                </a:schemeClr>
+              </a:solidFill>
+              <a:latin typeface="Bahnschrift" panose="020B0502040204020203" pitchFamily="34" charset="0"/>
+            </a:endParaRPr>
+          </a:p>
+          <a:p>
+            <a:r>
+              <a:rPr sz="2000" dirty="0">
+                <a:solidFill>
+                  <a:srgbClr val="FFC000"/>
+                </a:solidFill>
+                <a:latin typeface="Bahnschrift" panose="020B0502040204020203" pitchFamily="34" charset="0"/>
+              </a:rPr>
+              <a:t>→ Los </a:t>
+            </a:r>
+            <a:r>
+              <a:rPr sz="2000" dirty="0" err="1">
+                <a:solidFill>
+                  <a:srgbClr val="FFC000"/>
+                </a:solidFill>
+                <a:latin typeface="Bahnschrift" panose="020B0502040204020203" pitchFamily="34" charset="0"/>
+              </a:rPr>
+              <a:t>datos</a:t>
+            </a:r>
+            <a:r>
+              <a:rPr sz="2000" dirty="0">
+                <a:solidFill>
+                  <a:srgbClr val="FFC000"/>
+                </a:solidFill>
+                <a:latin typeface="Bahnschrift" panose="020B0502040204020203" pitchFamily="34" charset="0"/>
+              </a:rPr>
+              <a:t> </a:t>
+            </a:r>
+            <a:r>
+              <a:rPr sz="2000" dirty="0" err="1">
+                <a:solidFill>
+                  <a:srgbClr val="FFC000"/>
+                </a:solidFill>
+                <a:latin typeface="Bahnschrift" panose="020B0502040204020203" pitchFamily="34" charset="0"/>
+              </a:rPr>
+              <a:t>pueden</a:t>
+            </a:r>
+            <a:r>
+              <a:rPr sz="2000" dirty="0">
+                <a:solidFill>
+                  <a:srgbClr val="FFC000"/>
+                </a:solidFill>
+                <a:latin typeface="Bahnschrift" panose="020B0502040204020203" pitchFamily="34" charset="0"/>
+              </a:rPr>
+              <a:t> </a:t>
+            </a:r>
+            <a:r>
+              <a:rPr sz="2000" dirty="0" err="1">
+                <a:solidFill>
+                  <a:srgbClr val="FFC000"/>
+                </a:solidFill>
+                <a:latin typeface="Bahnschrift" panose="020B0502040204020203" pitchFamily="34" charset="0"/>
+              </a:rPr>
+              <a:t>inspirar</a:t>
+            </a:r>
+            <a:r>
+              <a:rPr sz="2000" dirty="0">
+                <a:solidFill>
+                  <a:srgbClr val="FFC000"/>
+                </a:solidFill>
+                <a:latin typeface="Bahnschrift" panose="020B0502040204020203" pitchFamily="34" charset="0"/>
+              </a:rPr>
+              <a:t> </a:t>
+            </a:r>
+            <a:r>
+              <a:rPr sz="2000" dirty="0" err="1">
+                <a:solidFill>
+                  <a:srgbClr val="FFC000"/>
+                </a:solidFill>
+                <a:latin typeface="Bahnschrift" panose="020B0502040204020203" pitchFamily="34" charset="0"/>
+              </a:rPr>
+              <a:t>creatividad</a:t>
+            </a:r>
+            <a:r>
+              <a:rPr sz="2000" dirty="0">
+                <a:solidFill>
+                  <a:srgbClr val="FFC000"/>
+                </a:solidFill>
+                <a:latin typeface="Bahnschrift" panose="020B0502040204020203" pitchFamily="34" charset="0"/>
+              </a:rPr>
+              <a:t> y </a:t>
+            </a:r>
+            <a:r>
+              <a:rPr sz="2000" dirty="0" err="1">
+                <a:solidFill>
+                  <a:srgbClr val="FFC000"/>
+                </a:solidFill>
+                <a:latin typeface="Bahnschrift" panose="020B0502040204020203" pitchFamily="34" charset="0"/>
+              </a:rPr>
+              <a:t>decisiones</a:t>
+            </a:r>
+            <a:r>
+              <a:rPr sz="2000" dirty="0">
+                <a:solidFill>
+                  <a:srgbClr val="FFC000"/>
+                </a:solidFill>
+                <a:latin typeface="Bahnschrift" panose="020B0502040204020203" pitchFamily="34" charset="0"/>
+              </a:rPr>
+              <a:t> de alto </a:t>
+            </a:r>
+            <a:r>
+              <a:rPr sz="2000" dirty="0" err="1">
+                <a:solidFill>
+                  <a:srgbClr val="FFC000"/>
+                </a:solidFill>
+                <a:latin typeface="Bahnschrift" panose="020B0502040204020203" pitchFamily="34" charset="0"/>
+              </a:rPr>
+              <a:t>impacto</a:t>
+            </a:r>
+            <a:r>
+              <a:rPr sz="2000" dirty="0">
+                <a:solidFill>
+                  <a:srgbClr val="FFC000"/>
+                </a:solidFill>
+                <a:latin typeface="Bahnschrift" panose="020B0502040204020203" pitchFamily="34" charset="0"/>
+              </a:rPr>
+              <a:t>.</a:t>
+            </a:r>
+          </a:p>
+        </p:txBody>
+      </p:sp>
+    </p:spTree>
+  </p:cSld>
+  <p:clrMapOvr>
+    <a:masterClrMapping/>
+  </p:clrMapOvr>
+</p:sld>
+</file>
+
+<file path=ppt/slides/slide9.xml><?xml version="1.0" encoding="utf-8"?>
+<p:sld xmlns:a="http://schemas.openxmlformats.org/drawingml/2006/main" xmlns:r="http://schemas.openxmlformats.org/officeDocument/2006/relationships" xmlns:p="http://schemas.openxmlformats.org/presentationml/2006/main">
+  <p:cSld>
+    <p:spTree>
+      <p:nvGrpSpPr>
+        <p:cNvPr id="1" name=""/>
+        <p:cNvGrpSpPr/>
+        <p:nvPr/>
+      </p:nvGrpSpPr>
+      <p:grpSpPr>
+        <a:xfrm>
+          <a:off x="0" y="0"/>
+          <a:ext cx="0" cy="0"/>
+          <a:chOff x="0" y="0"/>
+          <a:chExt cx="0" cy="0"/>
+        </a:xfrm>
+      </p:grpSpPr>
+      <p:sp>
+        <p:nvSpPr>
           <p:cNvPr id="2" name="TextBox 1"/>
           <p:cNvSpPr txBox="1"/>
           <p:nvPr/>
@@ -10363,7 +10481,7 @@
         <p:spPr>
           <a:xfrm>
             <a:off x="758268" y="2229493"/>
-            <a:ext cx="4738733" cy="584775"/>
+            <a:ext cx="5730992" cy="584775"/>
           </a:xfrm>
           <a:prstGeom prst="rect">
             <a:avLst/>
@@ -10380,28 +10498,8 @@
               <a:defRPr sz="3200" b="1"/>
             </a:pPr>
             <a:r>
-              <a:rPr dirty="0"/>
-              <a:t>Gracias por </a:t>
-            </a:r>
-            <a:r>
-              <a:rPr dirty="0" err="1"/>
-              <a:t>ver</a:t>
-            </a:r>
-            <a:r>
-              <a:rPr dirty="0"/>
-              <a:t> </a:t>
-            </a:r>
-            <a:r>
-              <a:rPr dirty="0" err="1"/>
-              <a:t>el</a:t>
-            </a:r>
-            <a:r>
-              <a:rPr dirty="0"/>
-              <a:t> </a:t>
-            </a:r>
-            <a:r>
-              <a:rPr dirty="0" err="1"/>
-              <a:t>proyecto</a:t>
+              <a:rPr lang="es-AR" dirty="0"/>
+              <a:t> Que preguntarías a estos datos?</a:t>
             </a:r>
             <a:endParaRPr dirty="0"/>
           </a:p>
@@ -10415,8 +10513,8 @@
         </p:nvSpPr>
         <p:spPr>
           <a:xfrm>
-            <a:off x="2167848" y="3429000"/>
-            <a:ext cx="4582601" cy="369332"/>
+            <a:off x="1781364" y="4082261"/>
+            <a:ext cx="5581271" cy="369332"/>
           </a:xfrm>
           <a:prstGeom prst="rect">
             <a:avLst/>
@@ -10445,18 +10543,57 @@
               <a:t>GitHub: Jesikab10 | LinkedIn: </a:t>
             </a:r>
             <a:r>
-              <a:rPr dirty="0" err="1">
+              <a:rPr lang="es-AR" dirty="0">
                 <a:solidFill>
                   <a:srgbClr val="FFC000"/>
                 </a:solidFill>
               </a:rPr>
-              <a:t>jesika-berroteran</a:t>
+              <a:t>jesika-berroteran-b16a3a32</a:t>
             </a:r>
             <a:endParaRPr dirty="0">
               <a:solidFill>
                 <a:srgbClr val="FFC000"/>
               </a:solidFill>
             </a:endParaRPr>
+          </a:p>
+        </p:txBody>
+      </p:sp>
+      <p:sp>
+        <p:nvSpPr>
+          <p:cNvPr id="4" name="TextBox 3">
+            <a:extLst>
+              <a:ext uri="{FF2B5EF4-FFF2-40B4-BE49-F238E27FC236}">
+                <a16:creationId xmlns:a16="http://schemas.microsoft.com/office/drawing/2014/main" id="{98EBA95F-3BDE-4295-A9E7-A69FB97633E5}"/>
+              </a:ext>
+            </a:extLst>
+          </p:cNvPr>
+          <p:cNvSpPr txBox="1"/>
+          <p:nvPr/>
+        </p:nvSpPr>
+        <p:spPr>
+          <a:xfrm>
+            <a:off x="1781364" y="2984653"/>
+            <a:ext cx="4210576" cy="584775"/>
+          </a:xfrm>
+          <a:prstGeom prst="rect">
+            <a:avLst/>
+          </a:prstGeom>
+          <a:noFill/>
+        </p:spPr>
+        <p:txBody>
+          <a:bodyPr wrap="none">
+            <a:spAutoFit/>
+          </a:bodyPr>
+          <a:lstStyle/>
+          <a:p>
+            <a:pPr>
+              <a:defRPr sz="3200" b="1"/>
+            </a:pPr>
+            <a:r>
+              <a:rPr lang="es-AR" dirty="0"/>
+              <a:t> Que historia contarías?</a:t>
+            </a:r>
+            <a:endParaRPr dirty="0"/>
           </a:p>
         </p:txBody>
       </p:sp>

</xml_diff>